<commit_message>
Added math details to W1S1, working repo for diffusion models to W12S3 and Physics-informed Neural Networks to End slides.
</commit_message>
<xml_diff>
--- a/W12/3. W12S3 final/W12S3.pptx
+++ b/W12/3. W12S3 final/W12S3.pptx
@@ -5,7 +5,7 @@
     <p:sldMasterId id="2147483648" r:id="rId1"/>
   </p:sldMasterIdLst>
   <p:notesMasterIdLst>
-    <p:notesMasterId r:id="rId41"/>
+    <p:notesMasterId r:id="rId42"/>
   </p:notesMasterIdLst>
   <p:sldIdLst>
     <p:sldId id="377" r:id="rId2"/>
@@ -26,27 +26,28 @@
     <p:sldId id="700" r:id="rId17"/>
     <p:sldId id="718" r:id="rId18"/>
     <p:sldId id="701" r:id="rId19"/>
-    <p:sldId id="706" r:id="rId20"/>
-    <p:sldId id="730" r:id="rId21"/>
-    <p:sldId id="704" r:id="rId22"/>
-    <p:sldId id="720" r:id="rId23"/>
-    <p:sldId id="722" r:id="rId24"/>
-    <p:sldId id="723" r:id="rId25"/>
-    <p:sldId id="699" r:id="rId26"/>
-    <p:sldId id="707" r:id="rId27"/>
-    <p:sldId id="708" r:id="rId28"/>
-    <p:sldId id="712" r:id="rId29"/>
-    <p:sldId id="711" r:id="rId30"/>
-    <p:sldId id="716" r:id="rId31"/>
-    <p:sldId id="717" r:id="rId32"/>
-    <p:sldId id="714" r:id="rId33"/>
-    <p:sldId id="724" r:id="rId34"/>
-    <p:sldId id="731" r:id="rId35"/>
-    <p:sldId id="732" r:id="rId36"/>
-    <p:sldId id="725" r:id="rId37"/>
-    <p:sldId id="726" r:id="rId38"/>
-    <p:sldId id="727" r:id="rId39"/>
-    <p:sldId id="728" r:id="rId40"/>
+    <p:sldId id="734" r:id="rId20"/>
+    <p:sldId id="706" r:id="rId21"/>
+    <p:sldId id="730" r:id="rId22"/>
+    <p:sldId id="704" r:id="rId23"/>
+    <p:sldId id="720" r:id="rId24"/>
+    <p:sldId id="722" r:id="rId25"/>
+    <p:sldId id="723" r:id="rId26"/>
+    <p:sldId id="699" r:id="rId27"/>
+    <p:sldId id="707" r:id="rId28"/>
+    <p:sldId id="708" r:id="rId29"/>
+    <p:sldId id="712" r:id="rId30"/>
+    <p:sldId id="711" r:id="rId31"/>
+    <p:sldId id="716" r:id="rId32"/>
+    <p:sldId id="717" r:id="rId33"/>
+    <p:sldId id="714" r:id="rId34"/>
+    <p:sldId id="724" r:id="rId35"/>
+    <p:sldId id="731" r:id="rId36"/>
+    <p:sldId id="732" r:id="rId37"/>
+    <p:sldId id="725" r:id="rId38"/>
+    <p:sldId id="726" r:id="rId39"/>
+    <p:sldId id="727" r:id="rId40"/>
+    <p:sldId id="728" r:id="rId41"/>
   </p:sldIdLst>
   <p:sldSz cx="12192000" cy="6858000"/>
   <p:notesSz cx="6858000" cy="9144000"/>
@@ -176,6 +177,7 @@
             <p14:sldId id="700"/>
             <p14:sldId id="718"/>
             <p14:sldId id="701"/>
+            <p14:sldId id="734"/>
             <p14:sldId id="706"/>
             <p14:sldId id="730"/>
             <p14:sldId id="704"/>
@@ -223,7 +225,7 @@
 <file path=ppt/revisionInfo.xml><?xml version="1.0" encoding="utf-8"?>
 <p1510:revInfo xmlns:a="http://schemas.openxmlformats.org/drawingml/2006/main" xmlns:r="http://schemas.openxmlformats.org/officeDocument/2006/relationships" xmlns:p1510="http://schemas.microsoft.com/office/powerpoint/2015/10/main">
   <p1510:revLst>
-    <p1510:client id="{1C20FA8B-D315-4EDF-967A-6B5C98F8BE64}" v="10" dt="2023-09-07T09:33:49.973"/>
+    <p1510:client id="{1C20FA8B-D315-4EDF-967A-6B5C98F8BE64}" v="11" dt="2023-09-27T02:23:01.567"/>
   </p1510:revLst>
 </p1510:revInfo>
 </file>
@@ -603,7 +605,7 @@
   <pc:docChgLst>
     <pc:chgData name="Matthieu De Mari" userId="dfb708c9-d8dc-439f-9a3b-c772bf4a311c" providerId="ADAL" clId="{1C20FA8B-D315-4EDF-967A-6B5C98F8BE64}"/>
     <pc:docChg chg="undo custSel addSld delSld modSld addSection modSection">
-      <pc:chgData name="Matthieu De Mari" userId="dfb708c9-d8dc-439f-9a3b-c772bf4a311c" providerId="ADAL" clId="{1C20FA8B-D315-4EDF-967A-6B5C98F8BE64}" dt="2023-09-07T09:34:31.102" v="1191" actId="20577"/>
+      <pc:chgData name="Matthieu De Mari" userId="dfb708c9-d8dc-439f-9a3b-c772bf4a311c" providerId="ADAL" clId="{1C20FA8B-D315-4EDF-967A-6B5C98F8BE64}" dt="2023-09-27T02:23:46.157" v="1340" actId="20577"/>
       <pc:docMkLst>
         <pc:docMk/>
       </pc:docMkLst>
@@ -907,6 +909,28 @@
             <pc:docMk/>
             <pc:sldMk cId="885132000" sldId="732"/>
             <ac:spMk id="3" creationId="{42E94496-CCBC-467D-504B-C943DBDCBD88}"/>
+          </ac:spMkLst>
+        </pc:spChg>
+      </pc:sldChg>
+      <pc:sldChg chg="new del">
+        <pc:chgData name="Matthieu De Mari" userId="dfb708c9-d8dc-439f-9a3b-c772bf4a311c" providerId="ADAL" clId="{1C20FA8B-D315-4EDF-967A-6B5C98F8BE64}" dt="2023-09-27T02:21:24.850" v="1194" actId="47"/>
+        <pc:sldMkLst>
+          <pc:docMk/>
+          <pc:sldMk cId="4185206847" sldId="733"/>
+        </pc:sldMkLst>
+      </pc:sldChg>
+      <pc:sldChg chg="modSp add mod">
+        <pc:chgData name="Matthieu De Mari" userId="dfb708c9-d8dc-439f-9a3b-c772bf4a311c" providerId="ADAL" clId="{1C20FA8B-D315-4EDF-967A-6B5C98F8BE64}" dt="2023-09-27T02:23:46.157" v="1340" actId="20577"/>
+        <pc:sldMkLst>
+          <pc:docMk/>
+          <pc:sldMk cId="2788259127" sldId="734"/>
+        </pc:sldMkLst>
+        <pc:spChg chg="mod">
+          <ac:chgData name="Matthieu De Mari" userId="dfb708c9-d8dc-439f-9a3b-c772bf4a311c" providerId="ADAL" clId="{1C20FA8B-D315-4EDF-967A-6B5C98F8BE64}" dt="2023-09-27T02:23:46.157" v="1340" actId="20577"/>
+          <ac:spMkLst>
+            <pc:docMk/>
+            <pc:sldMk cId="2788259127" sldId="734"/>
+            <ac:spMk id="3" creationId="{9D882609-53DF-4B06-91C6-50E0570C62D5}"/>
           </ac:spMkLst>
         </pc:spChg>
       </pc:sldChg>
@@ -1577,7 +1601,7 @@
           <a:p>
             <a:fld id="{61478373-EB31-4867-8CF0-FA31364748A5}" type="datetimeFigureOut">
               <a:rPr lang="en-GB" smtClean="0"/>
-              <a:t>07/09/2023</a:t>
+              <a:t>27/09/2023</a:t>
             </a:fld>
             <a:endParaRPr lang="en-GB"/>
           </a:p>
@@ -1994,7 +2018,7 @@
           <a:p>
             <a:fld id="{E85DF616-B21E-4EF6-A6A5-95E2FB3EB1A1}" type="datetimeFigureOut">
               <a:rPr lang="en-GB" smtClean="0"/>
-              <a:t>07/09/2023</a:t>
+              <a:t>27/09/2023</a:t>
             </a:fld>
             <a:endParaRPr lang="en-GB"/>
           </a:p>
@@ -2194,7 +2218,7 @@
           <a:p>
             <a:fld id="{E85DF616-B21E-4EF6-A6A5-95E2FB3EB1A1}" type="datetimeFigureOut">
               <a:rPr lang="en-GB" smtClean="0"/>
-              <a:t>07/09/2023</a:t>
+              <a:t>27/09/2023</a:t>
             </a:fld>
             <a:endParaRPr lang="en-GB"/>
           </a:p>
@@ -2404,7 +2428,7 @@
           <a:p>
             <a:fld id="{E85DF616-B21E-4EF6-A6A5-95E2FB3EB1A1}" type="datetimeFigureOut">
               <a:rPr lang="en-GB" smtClean="0"/>
-              <a:t>07/09/2023</a:t>
+              <a:t>27/09/2023</a:t>
             </a:fld>
             <a:endParaRPr lang="en-GB"/>
           </a:p>
@@ -2604,7 +2628,7 @@
           <a:p>
             <a:fld id="{E85DF616-B21E-4EF6-A6A5-95E2FB3EB1A1}" type="datetimeFigureOut">
               <a:rPr lang="en-GB" smtClean="0"/>
-              <a:t>07/09/2023</a:t>
+              <a:t>27/09/2023</a:t>
             </a:fld>
             <a:endParaRPr lang="en-GB"/>
           </a:p>
@@ -2880,7 +2904,7 @@
           <a:p>
             <a:fld id="{E85DF616-B21E-4EF6-A6A5-95E2FB3EB1A1}" type="datetimeFigureOut">
               <a:rPr lang="en-GB" smtClean="0"/>
-              <a:t>07/09/2023</a:t>
+              <a:t>27/09/2023</a:t>
             </a:fld>
             <a:endParaRPr lang="en-GB"/>
           </a:p>
@@ -3148,7 +3172,7 @@
           <a:p>
             <a:fld id="{E85DF616-B21E-4EF6-A6A5-95E2FB3EB1A1}" type="datetimeFigureOut">
               <a:rPr lang="en-GB" smtClean="0"/>
-              <a:t>07/09/2023</a:t>
+              <a:t>27/09/2023</a:t>
             </a:fld>
             <a:endParaRPr lang="en-GB"/>
           </a:p>
@@ -3563,7 +3587,7 @@
           <a:p>
             <a:fld id="{E85DF616-B21E-4EF6-A6A5-95E2FB3EB1A1}" type="datetimeFigureOut">
               <a:rPr lang="en-GB" smtClean="0"/>
-              <a:t>07/09/2023</a:t>
+              <a:t>27/09/2023</a:t>
             </a:fld>
             <a:endParaRPr lang="en-GB"/>
           </a:p>
@@ -3705,7 +3729,7 @@
           <a:p>
             <a:fld id="{E85DF616-B21E-4EF6-A6A5-95E2FB3EB1A1}" type="datetimeFigureOut">
               <a:rPr lang="en-GB" smtClean="0"/>
-              <a:t>07/09/2023</a:t>
+              <a:t>27/09/2023</a:t>
             </a:fld>
             <a:endParaRPr lang="en-GB"/>
           </a:p>
@@ -3818,7 +3842,7 @@
           <a:p>
             <a:fld id="{E85DF616-B21E-4EF6-A6A5-95E2FB3EB1A1}" type="datetimeFigureOut">
               <a:rPr lang="en-GB" smtClean="0"/>
-              <a:t>07/09/2023</a:t>
+              <a:t>27/09/2023</a:t>
             </a:fld>
             <a:endParaRPr lang="en-GB"/>
           </a:p>
@@ -4131,7 +4155,7 @@
           <a:p>
             <a:fld id="{E85DF616-B21E-4EF6-A6A5-95E2FB3EB1A1}" type="datetimeFigureOut">
               <a:rPr lang="en-GB" smtClean="0"/>
-              <a:t>07/09/2023</a:t>
+              <a:t>27/09/2023</a:t>
             </a:fld>
             <a:endParaRPr lang="en-GB"/>
           </a:p>
@@ -4420,7 +4444,7 @@
           <a:p>
             <a:fld id="{E85DF616-B21E-4EF6-A6A5-95E2FB3EB1A1}" type="datetimeFigureOut">
               <a:rPr lang="en-GB" smtClean="0"/>
-              <a:t>07/09/2023</a:t>
+              <a:t>27/09/2023</a:t>
             </a:fld>
             <a:endParaRPr lang="en-GB"/>
           </a:p>
@@ -4663,7 +4687,7 @@
           <a:p>
             <a:fld id="{E85DF616-B21E-4EF6-A6A5-95E2FB3EB1A1}" type="datetimeFigureOut">
               <a:rPr lang="en-GB" smtClean="0"/>
-              <a:t>07/09/2023</a:t>
+              <a:t>27/09/2023</a:t>
             </a:fld>
             <a:endParaRPr lang="en-GB"/>
           </a:p>
@@ -6852,92 +6876,76 @@
             </a:pPr>
             <a:r>
               <a:rPr lang="en-GB" b="1" dirty="0"/>
-              <a:t>More stuff</a:t>
-            </a:r>
-          </a:p>
-          <a:p>
-            <a:r>
-              <a:rPr lang="en-GB" dirty="0"/>
-              <a:t>Advanced Probability and Statistics (a.k.a. Statistical Learning) is always a great plus…</a:t>
-            </a:r>
-            <a:br>
-              <a:rPr lang="en-GB" dirty="0"/>
-            </a:br>
+              <a:t>So, I hear you’re into physics?</a:t>
+            </a:r>
+          </a:p>
+          <a:p>
+            <a:pPr marL="0" indent="0">
+              <a:buNone/>
+            </a:pPr>
+            <a:r>
+              <a:rPr lang="en-GB" b="1" dirty="0"/>
+              <a:t>Physics-informed neural networks</a:t>
+            </a:r>
+            <a:r>
+              <a:rPr lang="en-GB" dirty="0"/>
+              <a:t> (</a:t>
+            </a:r>
+            <a:r>
+              <a:rPr lang="en-GB" b="1" dirty="0"/>
+              <a:t>PINNs</a:t>
+            </a:r>
+            <a:r>
+              <a:rPr lang="en-GB" dirty="0"/>
+              <a:t>) are a type of universal function approximators that can embed the knowledge of any physical laws that govern a given dataset in the learning process</a:t>
+            </a:r>
+          </a:p>
+          <a:p>
+            <a:pPr marL="0" indent="0">
+              <a:buNone/>
+            </a:pPr>
+            <a:r>
+              <a:rPr lang="en-GB" dirty="0"/>
+              <a:t>Typically, they can be used to describe, otherwise hard-to-solve, </a:t>
+            </a:r>
             <a:r>
               <a:rPr lang="en-GB" dirty="0">
-                <a:hlinkClick r:id="rId2"/>
+                <a:hlinkClick r:id="rId2" tooltip="Partial differential equation">
+                  <a:extLst>
+                    <a:ext uri="{A12FA001-AC4F-418D-AE19-62706E023703}">
+                      <ahyp:hlinkClr xmlns:ahyp="http://schemas.microsoft.com/office/drawing/2018/hyperlinkcolor" val="tx"/>
+                    </a:ext>
+                  </a:extLst>
+                </a:hlinkClick>
               </a:rPr>
-              <a:t>https://www.statlearning.com/</a:t>
+              <a:t>partial differential equations</a:t>
+            </a:r>
+            <a:r>
+              <a:rPr lang="en-GB" dirty="0"/>
+              <a:t> (PDEs).</a:t>
+            </a:r>
+          </a:p>
+          <a:p>
+            <a:pPr marL="0" indent="0">
+              <a:buNone/>
+            </a:pPr>
+            <a:r>
+              <a:rPr lang="en-GB" dirty="0"/>
+              <a:t>Curious? </a:t>
+            </a:r>
+            <a:r>
+              <a:rPr lang="en-GB"/>
+              <a:t>A tutorial below.</a:t>
             </a:r>
             <a:endParaRPr lang="en-GB" dirty="0"/>
           </a:p>
           <a:p>
             <a:r>
-              <a:rPr lang="en-GB" dirty="0"/>
-              <a:t>Neuroscience should probably be part of any serious AI curriculum…</a:t>
-            </a:r>
-            <a:br>
-              <a:rPr lang="en-GB" dirty="0"/>
-            </a:br>
-            <a:r>
-              <a:rPr lang="en-GB" dirty="0"/>
-              <a:t>[</a:t>
-            </a:r>
-            <a:r>
-              <a:rPr lang="en-GB" dirty="0" err="1"/>
-              <a:t>NeuroAI</a:t>
-            </a:r>
-            <a:r>
-              <a:rPr lang="en-GB" dirty="0"/>
-              <a:t>] Barron et al., “</a:t>
-            </a:r>
-            <a:r>
-              <a:rPr lang="en-US" dirty="0"/>
-              <a:t>What insects can tell us about the origins of consciousness”, 2015.</a:t>
-            </a:r>
-            <a:br>
-              <a:rPr lang="en-US" dirty="0"/>
-            </a:br>
-            <a:r>
-              <a:rPr lang="en-US" dirty="0"/>
-              <a:t>[</a:t>
-            </a:r>
-            <a:r>
-              <a:rPr lang="en-GB" dirty="0"/>
-              <a:t>Kurzweil</a:t>
-            </a:r>
-            <a:r>
-              <a:rPr lang="en-US" dirty="0"/>
-              <a:t>] </a:t>
-            </a:r>
-            <a:r>
-              <a:rPr lang="en-GB" dirty="0"/>
-              <a:t>R. Kurzweil, “How to Create a Mind: The Secret of Human Thought Revealed”, 2012.</a:t>
-            </a:r>
-            <a:br>
-              <a:rPr lang="en-GB" dirty="0"/>
-            </a:br>
-            <a:r>
-              <a:rPr lang="en-GB" dirty="0"/>
-              <a:t>[Marcus] G. Marcus, “The Future of the Brain”, 2014.</a:t>
-            </a:r>
-          </a:p>
-          <a:p>
-            <a:pPr marL="0" indent="0">
-              <a:buNone/>
-            </a:pPr>
-            <a:r>
-              <a:rPr lang="en-GB" dirty="0"/>
-              <a:t>Etc.</a:t>
-            </a:r>
-          </a:p>
-          <a:p>
-            <a:endParaRPr lang="en-GB" dirty="0"/>
-          </a:p>
-          <a:p>
-            <a:pPr marL="0" indent="0">
-              <a:buNone/>
-            </a:pPr>
+              <a:rPr lang="en-GB" dirty="0">
+                <a:hlinkClick r:id="rId3"/>
+              </a:rPr>
+              <a:t>https://towardsdatascience.com/solving-differential-equations-with-neural-networks-afdcf7b8bcc4</a:t>
+            </a:r>
             <a:endParaRPr lang="en-GB" dirty="0"/>
           </a:p>
           <a:p>
@@ -6960,7 +6968,7 @@
     </p:spTree>
     <p:extLst>
       <p:ext uri="{BB962C8B-B14F-4D97-AF65-F5344CB8AC3E}">
-        <p14:creationId xmlns:p14="http://schemas.microsoft.com/office/powerpoint/2010/main" val="86124098"/>
+        <p14:creationId xmlns:p14="http://schemas.microsoft.com/office/powerpoint/2010/main" val="2788259127"/>
       </p:ext>
     </p:extLst>
   </p:cSld>
@@ -7213,42 +7221,71 @@
             </a:r>
           </a:p>
           <a:p>
-            <a:pPr marL="0" indent="0">
-              <a:buNone/>
-            </a:pPr>
-            <a:r>
-              <a:rPr lang="en-GB" dirty="0"/>
-              <a:t>Many more courses available for free/cheap out there…</a:t>
-            </a:r>
-          </a:p>
-          <a:p>
+            <a:r>
+              <a:rPr lang="en-GB" dirty="0"/>
+              <a:t>Advanced Probability and Statistics (a.k.a. Statistical Learning) is always a great plus…</a:t>
+            </a:r>
+            <a:br>
+              <a:rPr lang="en-GB" dirty="0"/>
+            </a:br>
             <a:r>
               <a:rPr lang="en-GB" dirty="0">
                 <a:hlinkClick r:id="rId2"/>
               </a:rPr>
-              <a:t>https://www.linkedin.com/posts/endritrestelica_ai-artificialintelliegence-activity-7069768595978776576-Cvsk/</a:t>
-            </a:r>
-            <a:r>
-              <a:rPr lang="en-GB" dirty="0"/>
-              <a:t> </a:t>
-            </a:r>
-          </a:p>
-          <a:p>
-            <a:r>
-              <a:rPr lang="en-GB" dirty="0">
-                <a:hlinkClick r:id="rId3"/>
-              </a:rPr>
-              <a:t>https://www.linkedin.com/posts/amanc_artificialintelligence-machinelearning-ai-activity-7052863983908753408-OPfM/</a:t>
-            </a:r>
-            <a:r>
-              <a:rPr lang="en-GB" dirty="0"/>
-              <a:t> </a:t>
-            </a:r>
-          </a:p>
-          <a:p>
-            <a:endParaRPr lang="en-GB" dirty="0">
-              <a:hlinkClick r:id="rId4"/>
-            </a:endParaRPr>
+              <a:t>https://www.statlearning.com/</a:t>
+            </a:r>
+            <a:endParaRPr lang="en-GB" dirty="0"/>
+          </a:p>
+          <a:p>
+            <a:r>
+              <a:rPr lang="en-GB" dirty="0"/>
+              <a:t>Neuroscience should probably be part of any serious AI curriculum…</a:t>
+            </a:r>
+            <a:br>
+              <a:rPr lang="en-GB" dirty="0"/>
+            </a:br>
+            <a:r>
+              <a:rPr lang="en-GB" dirty="0"/>
+              <a:t>[</a:t>
+            </a:r>
+            <a:r>
+              <a:rPr lang="en-GB" dirty="0" err="1"/>
+              <a:t>NeuroAI</a:t>
+            </a:r>
+            <a:r>
+              <a:rPr lang="en-GB" dirty="0"/>
+              <a:t>] Barron et al., “</a:t>
+            </a:r>
+            <a:r>
+              <a:rPr lang="en-US" dirty="0"/>
+              <a:t>What insects can tell us about the origins of consciousness”, 2015.</a:t>
+            </a:r>
+            <a:br>
+              <a:rPr lang="en-US" dirty="0"/>
+            </a:br>
+            <a:r>
+              <a:rPr lang="en-US" dirty="0"/>
+              <a:t>[</a:t>
+            </a:r>
+            <a:r>
+              <a:rPr lang="en-GB" dirty="0"/>
+              <a:t>Kurzweil</a:t>
+            </a:r>
+            <a:r>
+              <a:rPr lang="en-US" dirty="0"/>
+              <a:t>] </a:t>
+            </a:r>
+            <a:r>
+              <a:rPr lang="en-GB" dirty="0"/>
+              <a:t>R. Kurzweil, “How to Create a Mind: The Secret of Human Thought Revealed”, 2012.</a:t>
+            </a:r>
+            <a:br>
+              <a:rPr lang="en-GB" dirty="0"/>
+            </a:br>
+            <a:r>
+              <a:rPr lang="en-GB" dirty="0"/>
+              <a:t>[Marcus] G. Marcus, “The Future of the Brain”, 2014.</a:t>
+            </a:r>
           </a:p>
           <a:p>
             <a:pPr marL="0" indent="0">
@@ -7256,23 +7293,11 @@
             </a:pPr>
             <a:r>
               <a:rPr lang="en-GB" dirty="0"/>
-              <a:t>Possibly the best repo ever created on GitHub for CS stuff…</a:t>
-            </a:r>
-            <a:endParaRPr lang="en-GB" dirty="0">
-              <a:hlinkClick r:id="rId4"/>
-            </a:endParaRPr>
-          </a:p>
-          <a:p>
-            <a:r>
-              <a:rPr lang="en-GB" dirty="0">
-                <a:hlinkClick r:id="rId4"/>
-              </a:rPr>
-              <a:t>https://github.com/Developer-Y/cs-video-courses</a:t>
-            </a:r>
-            <a:r>
-              <a:rPr lang="en-GB" dirty="0"/>
-              <a:t> </a:t>
-            </a:r>
+              <a:t>Etc.</a:t>
+            </a:r>
+          </a:p>
+          <a:p>
+            <a:endParaRPr lang="en-GB" dirty="0"/>
           </a:p>
           <a:p>
             <a:pPr marL="0" indent="0">
@@ -7300,7 +7325,7 @@
     </p:spTree>
     <p:extLst>
       <p:ext uri="{BB962C8B-B14F-4D97-AF65-F5344CB8AC3E}">
-        <p14:creationId xmlns:p14="http://schemas.microsoft.com/office/powerpoint/2010/main" val="2346545552"/>
+        <p14:creationId xmlns:p14="http://schemas.microsoft.com/office/powerpoint/2010/main" val="86124098"/>
       </p:ext>
     </p:extLst>
   </p:cSld>
@@ -7393,6 +7418,186 @@
             </a:r>
           </a:p>
           <a:p>
+            <a:pPr marL="0" indent="0">
+              <a:buNone/>
+            </a:pPr>
+            <a:r>
+              <a:rPr lang="en-GB" dirty="0"/>
+              <a:t>Many more courses available for free/cheap out there…</a:t>
+            </a:r>
+          </a:p>
+          <a:p>
+            <a:r>
+              <a:rPr lang="en-GB" dirty="0">
+                <a:hlinkClick r:id="rId2"/>
+              </a:rPr>
+              <a:t>https://www.linkedin.com/posts/endritrestelica_ai-artificialintelliegence-activity-7069768595978776576-Cvsk/</a:t>
+            </a:r>
+            <a:r>
+              <a:rPr lang="en-GB" dirty="0"/>
+              <a:t> </a:t>
+            </a:r>
+          </a:p>
+          <a:p>
+            <a:r>
+              <a:rPr lang="en-GB" dirty="0">
+                <a:hlinkClick r:id="rId3"/>
+              </a:rPr>
+              <a:t>https://www.linkedin.com/posts/amanc_artificialintelligence-machinelearning-ai-activity-7052863983908753408-OPfM/</a:t>
+            </a:r>
+            <a:r>
+              <a:rPr lang="en-GB" dirty="0"/>
+              <a:t> </a:t>
+            </a:r>
+          </a:p>
+          <a:p>
+            <a:endParaRPr lang="en-GB" dirty="0">
+              <a:hlinkClick r:id="rId4"/>
+            </a:endParaRPr>
+          </a:p>
+          <a:p>
+            <a:pPr marL="0" indent="0">
+              <a:buNone/>
+            </a:pPr>
+            <a:r>
+              <a:rPr lang="en-GB" dirty="0"/>
+              <a:t>Possibly the best repo ever created on GitHub for CS stuff…</a:t>
+            </a:r>
+            <a:endParaRPr lang="en-GB" dirty="0">
+              <a:hlinkClick r:id="rId4"/>
+            </a:endParaRPr>
+          </a:p>
+          <a:p>
+            <a:r>
+              <a:rPr lang="en-GB" dirty="0">
+                <a:hlinkClick r:id="rId4"/>
+              </a:rPr>
+              <a:t>https://github.com/Developer-Y/cs-video-courses</a:t>
+            </a:r>
+            <a:r>
+              <a:rPr lang="en-GB" dirty="0"/>
+              <a:t> </a:t>
+            </a:r>
+          </a:p>
+          <a:p>
+            <a:pPr marL="0" indent="0">
+              <a:buNone/>
+            </a:pPr>
+            <a:endParaRPr lang="en-GB" dirty="0"/>
+          </a:p>
+          <a:p>
+            <a:endParaRPr lang="en-GB" dirty="0"/>
+          </a:p>
+          <a:p>
+            <a:pPr marL="0" indent="0">
+              <a:buNone/>
+            </a:pPr>
+            <a:endParaRPr lang="en-GB" dirty="0"/>
+          </a:p>
+          <a:p>
+            <a:pPr marL="0" indent="0">
+              <a:buNone/>
+            </a:pPr>
+            <a:endParaRPr lang="en-GB" dirty="0"/>
+          </a:p>
+        </p:txBody>
+      </p:sp>
+    </p:spTree>
+    <p:extLst>
+      <p:ext uri="{BB962C8B-B14F-4D97-AF65-F5344CB8AC3E}">
+        <p14:creationId xmlns:p14="http://schemas.microsoft.com/office/powerpoint/2010/main" val="2346545552"/>
+      </p:ext>
+    </p:extLst>
+  </p:cSld>
+  <p:clrMapOvr>
+    <a:masterClrMapping/>
+  </p:clrMapOvr>
+</p:sld>
+</file>
+
+<file path=ppt/slides/slide22.xml><?xml version="1.0" encoding="utf-8"?>
+<p:sld xmlns:a="http://schemas.openxmlformats.org/drawingml/2006/main" xmlns:r="http://schemas.openxmlformats.org/officeDocument/2006/relationships" xmlns:p="http://schemas.openxmlformats.org/presentationml/2006/main">
+  <p:cSld>
+    <p:spTree>
+      <p:nvGrpSpPr>
+        <p:cNvPr id="1" name=""/>
+        <p:cNvGrpSpPr/>
+        <p:nvPr/>
+      </p:nvGrpSpPr>
+      <p:grpSpPr>
+        <a:xfrm>
+          <a:off x="0" y="0"/>
+          <a:ext cx="0" cy="0"/>
+          <a:chOff x="0" y="0"/>
+          <a:chExt cx="0" cy="0"/>
+        </a:xfrm>
+      </p:grpSpPr>
+      <p:sp>
+        <p:nvSpPr>
+          <p:cNvPr id="2" name="Title 1">
+            <a:extLst>
+              <a:ext uri="{FF2B5EF4-FFF2-40B4-BE49-F238E27FC236}">
+                <a16:creationId xmlns:a16="http://schemas.microsoft.com/office/drawing/2014/main" id="{C826F7A7-7731-488B-8DF2-1407712F1EC1}"/>
+              </a:ext>
+            </a:extLst>
+          </p:cNvPr>
+          <p:cNvSpPr>
+            <a:spLocks noGrp="1"/>
+          </p:cNvSpPr>
+          <p:nvPr>
+            <p:ph type="title"/>
+          </p:nvPr>
+        </p:nvSpPr>
+        <p:spPr/>
+        <p:txBody>
+          <a:bodyPr/>
+          <a:lstStyle/>
+          <a:p>
+            <a:r>
+              <a:rPr lang="en-US" dirty="0"/>
+              <a:t>On top of everything we have seen…</a:t>
+            </a:r>
+            <a:endParaRPr lang="en-GB" dirty="0"/>
+          </a:p>
+        </p:txBody>
+      </p:sp>
+      <p:sp>
+        <p:nvSpPr>
+          <p:cNvPr id="3" name="Content Placeholder 2">
+            <a:extLst>
+              <a:ext uri="{FF2B5EF4-FFF2-40B4-BE49-F238E27FC236}">
+                <a16:creationId xmlns:a16="http://schemas.microsoft.com/office/drawing/2014/main" id="{9D882609-53DF-4B06-91C6-50E0570C62D5}"/>
+              </a:ext>
+            </a:extLst>
+          </p:cNvPr>
+          <p:cNvSpPr>
+            <a:spLocks noGrp="1"/>
+          </p:cNvSpPr>
+          <p:nvPr>
+            <p:ph idx="1"/>
+          </p:nvPr>
+        </p:nvSpPr>
+        <p:spPr>
+          <a:xfrm>
+            <a:off x="838200" y="1825624"/>
+            <a:ext cx="10515600" cy="5032375"/>
+          </a:xfrm>
+        </p:spPr>
+        <p:txBody>
+          <a:bodyPr>
+            <a:normAutofit/>
+          </a:bodyPr>
+          <a:lstStyle/>
+          <a:p>
+            <a:pPr marL="0" indent="0">
+              <a:buNone/>
+            </a:pPr>
+            <a:r>
+              <a:rPr lang="en-GB" b="1" dirty="0"/>
+              <a:t>More stuff</a:t>
+            </a:r>
+          </a:p>
+          <a:p>
             <a:r>
               <a:rPr lang="en-GB" dirty="0"/>
               <a:t>Using DL to solve complex differential equations.</a:t>
@@ -7469,7 +7674,7 @@
 </p:sld>
 </file>
 
-<file path=ppt/slides/slide22.xml><?xml version="1.0" encoding="utf-8"?>
+<file path=ppt/slides/slide23.xml><?xml version="1.0" encoding="utf-8"?>
 <p:sld xmlns:a="http://schemas.openxmlformats.org/drawingml/2006/main" xmlns:r="http://schemas.openxmlformats.org/officeDocument/2006/relationships" xmlns:p="http://schemas.openxmlformats.org/presentationml/2006/main">
   <p:cSld>
     <p:spTree>
@@ -7684,7 +7889,7 @@
 </p:sld>
 </file>
 
-<file path=ppt/slides/slide23.xml><?xml version="1.0" encoding="utf-8"?>
+<file path=ppt/slides/slide24.xml><?xml version="1.0" encoding="utf-8"?>
 <p:sld xmlns:a="http://schemas.openxmlformats.org/drawingml/2006/main" xmlns:r="http://schemas.openxmlformats.org/officeDocument/2006/relationships" xmlns:p="http://schemas.openxmlformats.org/presentationml/2006/main">
   <p:cSld>
     <p:spTree>
@@ -7869,7 +8074,7 @@
 </p:sld>
 </file>
 
-<file path=ppt/slides/slide24.xml><?xml version="1.0" encoding="utf-8"?>
+<file path=ppt/slides/slide25.xml><?xml version="1.0" encoding="utf-8"?>
 <p:sld xmlns:a="http://schemas.openxmlformats.org/drawingml/2006/main" xmlns:r="http://schemas.openxmlformats.org/officeDocument/2006/relationships" xmlns:p="http://schemas.openxmlformats.org/presentationml/2006/main">
   <p:cSld>
     <p:spTree>
@@ -8089,7 +8294,7 @@
 </p:sld>
 </file>
 
-<file path=ppt/slides/slide25.xml><?xml version="1.0" encoding="utf-8"?>
+<file path=ppt/slides/slide26.xml><?xml version="1.0" encoding="utf-8"?>
 <p:sld xmlns:a="http://schemas.openxmlformats.org/drawingml/2006/main" xmlns:r="http://schemas.openxmlformats.org/officeDocument/2006/relationships" xmlns:p="http://schemas.openxmlformats.org/presentationml/2006/main">
   <p:cSld>
     <p:spTree>
@@ -8189,7 +8394,7 @@
 </p:sld>
 </file>
 
-<file path=ppt/slides/slide26.xml><?xml version="1.0" encoding="utf-8"?>
+<file path=ppt/slides/slide27.xml><?xml version="1.0" encoding="utf-8"?>
 <p:sld xmlns:a="http://schemas.openxmlformats.org/drawingml/2006/main" xmlns:r="http://schemas.openxmlformats.org/officeDocument/2006/relationships" xmlns:p="http://schemas.openxmlformats.org/presentationml/2006/main">
   <p:cSld>
     <p:spTree>
@@ -8392,400 +8597,6 @@
 </p:sld>
 </file>
 
-<file path=ppt/slides/slide27.xml><?xml version="1.0" encoding="utf-8"?>
-<p:sld xmlns:a="http://schemas.openxmlformats.org/drawingml/2006/main" xmlns:r="http://schemas.openxmlformats.org/officeDocument/2006/relationships" xmlns:p="http://schemas.openxmlformats.org/presentationml/2006/main">
-  <p:cSld>
-    <p:spTree>
-      <p:nvGrpSpPr>
-        <p:cNvPr id="1" name=""/>
-        <p:cNvGrpSpPr/>
-        <p:nvPr/>
-      </p:nvGrpSpPr>
-      <p:grpSpPr>
-        <a:xfrm>
-          <a:off x="0" y="0"/>
-          <a:ext cx="0" cy="0"/>
-          <a:chOff x="0" y="0"/>
-          <a:chExt cx="0" cy="0"/>
-        </a:xfrm>
-      </p:grpSpPr>
-      <p:sp>
-        <p:nvSpPr>
-          <p:cNvPr id="4" name="Title 3">
-            <a:extLst>
-              <a:ext uri="{FF2B5EF4-FFF2-40B4-BE49-F238E27FC236}">
-                <a16:creationId xmlns:a16="http://schemas.microsoft.com/office/drawing/2014/main" id="{1715EAD9-59BF-46C0-9089-6E366691CAE9}"/>
-              </a:ext>
-            </a:extLst>
-          </p:cNvPr>
-          <p:cNvSpPr>
-            <a:spLocks noGrp="1"/>
-          </p:cNvSpPr>
-          <p:nvPr>
-            <p:ph type="title"/>
-          </p:nvPr>
-        </p:nvSpPr>
-        <p:spPr/>
-        <p:txBody>
-          <a:bodyPr/>
-          <a:lstStyle/>
-          <a:p>
-            <a:r>
-              <a:rPr lang="en-US" dirty="0"/>
-              <a:t>Add these researchers, companies and research </a:t>
-            </a:r>
-            <a:r>
-              <a:rPr lang="en-US" dirty="0" err="1"/>
-              <a:t>groupes</a:t>
-            </a:r>
-            <a:r>
-              <a:rPr lang="en-US" dirty="0"/>
-              <a:t> to your watchlist</a:t>
-            </a:r>
-            <a:endParaRPr lang="en-GB" dirty="0"/>
-          </a:p>
-        </p:txBody>
-      </p:sp>
-      <p:sp>
-        <p:nvSpPr>
-          <p:cNvPr id="5" name="Content Placeholder 4">
-            <a:extLst>
-              <a:ext uri="{FF2B5EF4-FFF2-40B4-BE49-F238E27FC236}">
-                <a16:creationId xmlns:a16="http://schemas.microsoft.com/office/drawing/2014/main" id="{279FF99D-84CB-436E-9373-43EB3F28720A}"/>
-              </a:ext>
-            </a:extLst>
-          </p:cNvPr>
-          <p:cNvSpPr>
-            <a:spLocks noGrp="1"/>
-          </p:cNvSpPr>
-          <p:nvPr>
-            <p:ph idx="1"/>
-          </p:nvPr>
-        </p:nvSpPr>
-        <p:spPr>
-          <a:xfrm>
-            <a:off x="838200" y="1825624"/>
-            <a:ext cx="10515600" cy="5032375"/>
-          </a:xfrm>
-        </p:spPr>
-        <p:txBody>
-          <a:bodyPr>
-            <a:noAutofit/>
-          </a:bodyPr>
-          <a:lstStyle/>
-          <a:p>
-            <a:r>
-              <a:rPr lang="en-GB" b="1" dirty="0" err="1"/>
-              <a:t>Demis</a:t>
-            </a:r>
-            <a:r>
-              <a:rPr lang="en-GB" dirty="0"/>
-              <a:t> </a:t>
-            </a:r>
-            <a:r>
-              <a:rPr lang="en-GB" b="1" dirty="0">
-                <a:solidFill>
-                  <a:schemeClr val="accent2">
-                    <a:lumMod val="50000"/>
-                  </a:schemeClr>
-                </a:solidFill>
-              </a:rPr>
-              <a:t>Hassabis</a:t>
-            </a:r>
-            <a:r>
-              <a:rPr lang="en-GB" dirty="0"/>
-              <a:t>: Co-founder of </a:t>
-            </a:r>
-            <a:r>
-              <a:rPr lang="en-GB" b="1" dirty="0">
-                <a:solidFill>
-                  <a:schemeClr val="accent2">
-                    <a:lumMod val="50000"/>
-                  </a:schemeClr>
-                </a:solidFill>
-              </a:rPr>
-              <a:t>DeepMind</a:t>
-            </a:r>
-            <a:r>
-              <a:rPr lang="en-GB" dirty="0"/>
-              <a:t>, </a:t>
-            </a:r>
-            <a:r>
-              <a:rPr lang="en-GB" b="1" dirty="0">
-                <a:solidFill>
-                  <a:schemeClr val="accent2">
-                    <a:lumMod val="50000"/>
-                  </a:schemeClr>
-                </a:solidFill>
-              </a:rPr>
-              <a:t>AlphaGo</a:t>
-            </a:r>
-            <a:r>
-              <a:rPr lang="en-GB" dirty="0"/>
-              <a:t>. Several contributions in </a:t>
-            </a:r>
-            <a:r>
-              <a:rPr lang="en-GB" b="1" dirty="0"/>
-              <a:t>Reinforcement</a:t>
-            </a:r>
-            <a:r>
-              <a:rPr lang="en-GB" dirty="0"/>
-              <a:t> </a:t>
-            </a:r>
-            <a:r>
-              <a:rPr lang="en-GB" b="1" dirty="0"/>
-              <a:t>Learning</a:t>
-            </a:r>
-            <a:r>
-              <a:rPr lang="en-GB" dirty="0"/>
-              <a:t>.</a:t>
-            </a:r>
-            <a:br>
-              <a:rPr lang="en-GB" dirty="0"/>
-            </a:br>
-            <a:r>
-              <a:rPr lang="en-GB" dirty="0">
-                <a:hlinkClick r:id="rId2"/>
-              </a:rPr>
-              <a:t>https://scholar.google.com/citations?hl=en&amp;user=dYpPMQEAAAAJ</a:t>
-            </a:r>
-            <a:endParaRPr lang="en-GB" dirty="0"/>
-          </a:p>
-          <a:p>
-            <a:r>
-              <a:rPr lang="en-GB" b="1" dirty="0"/>
-              <a:t>Alex</a:t>
-            </a:r>
-            <a:r>
-              <a:rPr lang="en-GB" dirty="0"/>
-              <a:t> </a:t>
-            </a:r>
-            <a:r>
-              <a:rPr lang="en-GB" b="1" dirty="0">
-                <a:solidFill>
-                  <a:schemeClr val="accent2">
-                    <a:lumMod val="50000"/>
-                  </a:schemeClr>
-                </a:solidFill>
-              </a:rPr>
-              <a:t>Graves</a:t>
-            </a:r>
-            <a:r>
-              <a:rPr lang="en-GB" dirty="0"/>
-              <a:t>: </a:t>
-            </a:r>
-            <a:r>
-              <a:rPr lang="en-GB" b="1" dirty="0"/>
-              <a:t>Professor</a:t>
-            </a:r>
-            <a:r>
-              <a:rPr lang="en-GB" dirty="0"/>
-              <a:t> at </a:t>
-            </a:r>
-            <a:r>
-              <a:rPr lang="en-GB" b="1" dirty="0"/>
-              <a:t>University</a:t>
-            </a:r>
-            <a:r>
-              <a:rPr lang="en-GB" dirty="0"/>
-              <a:t> </a:t>
-            </a:r>
-            <a:r>
-              <a:rPr lang="en-GB" b="1" dirty="0"/>
-              <a:t>of</a:t>
-            </a:r>
-            <a:r>
-              <a:rPr lang="en-GB" dirty="0"/>
-              <a:t> </a:t>
-            </a:r>
-            <a:r>
-              <a:rPr lang="en-GB" b="1" dirty="0"/>
-              <a:t>Toronto</a:t>
-            </a:r>
-            <a:r>
-              <a:rPr lang="en-GB" dirty="0"/>
-              <a:t>. Several contributions in </a:t>
-            </a:r>
-            <a:r>
-              <a:rPr lang="en-GB" b="1" dirty="0"/>
-              <a:t>Reinforcement</a:t>
-            </a:r>
-            <a:r>
-              <a:rPr lang="en-GB" dirty="0"/>
-              <a:t> </a:t>
-            </a:r>
-            <a:r>
-              <a:rPr lang="en-GB" b="1" dirty="0"/>
-              <a:t>Learning</a:t>
-            </a:r>
-            <a:r>
-              <a:rPr lang="en-GB" dirty="0"/>
-              <a:t>. </a:t>
-            </a:r>
-            <a:r>
-              <a:rPr lang="en-GB" dirty="0">
-                <a:hlinkClick r:id="rId3"/>
-              </a:rPr>
-              <a:t>https://scholar.google.co.uk/citations?user=DaFHynwAAAAJ&amp;hl=en</a:t>
-            </a:r>
-            <a:endParaRPr lang="en-GB" dirty="0"/>
-          </a:p>
-          <a:p>
-            <a:r>
-              <a:rPr lang="en-GB" b="1" dirty="0"/>
-              <a:t>Michael</a:t>
-            </a:r>
-            <a:r>
-              <a:rPr lang="en-GB" dirty="0"/>
-              <a:t> </a:t>
-            </a:r>
-            <a:r>
-              <a:rPr lang="en-GB" b="1" dirty="0"/>
-              <a:t>I.</a:t>
-            </a:r>
-            <a:r>
-              <a:rPr lang="en-GB" dirty="0"/>
-              <a:t> </a:t>
-            </a:r>
-            <a:r>
-              <a:rPr lang="en-GB" b="1" dirty="0">
-                <a:solidFill>
-                  <a:schemeClr val="accent2">
-                    <a:lumMod val="50000"/>
-                  </a:schemeClr>
-                </a:solidFill>
-              </a:rPr>
-              <a:t>Jordan</a:t>
-            </a:r>
-            <a:r>
-              <a:rPr lang="en-GB" dirty="0"/>
-              <a:t>: Professor at </a:t>
-            </a:r>
-            <a:r>
-              <a:rPr lang="en-GB" b="1" dirty="0"/>
-              <a:t>UC Berkeley</a:t>
-            </a:r>
-            <a:r>
-              <a:rPr lang="en-GB" dirty="0"/>
-              <a:t>, co-inventor of LDA.</a:t>
-            </a:r>
-            <a:br>
-              <a:rPr lang="en-GB" dirty="0"/>
-            </a:br>
-            <a:r>
-              <a:rPr lang="en-GB" dirty="0">
-                <a:hlinkClick r:id="rId4"/>
-              </a:rPr>
-              <a:t>https://scholar.google.com/citations?user=yxUduqMAAAAJ&amp;hl=fr</a:t>
-            </a:r>
-            <a:endParaRPr lang="en-GB" dirty="0"/>
-          </a:p>
-          <a:p>
-            <a:r>
-              <a:rPr lang="en-GB" b="1" dirty="0"/>
-              <a:t>Terrence</a:t>
-            </a:r>
-            <a:r>
-              <a:rPr lang="en-GB" dirty="0"/>
-              <a:t> </a:t>
-            </a:r>
-            <a:r>
-              <a:rPr lang="en-GB" b="1" dirty="0" err="1">
-                <a:solidFill>
-                  <a:schemeClr val="accent2">
-                    <a:lumMod val="50000"/>
-                  </a:schemeClr>
-                </a:solidFill>
-              </a:rPr>
-              <a:t>Sejnowski</a:t>
-            </a:r>
-            <a:r>
-              <a:rPr lang="en-GB" dirty="0"/>
-              <a:t>: </a:t>
-            </a:r>
-            <a:r>
-              <a:rPr lang="en-GB" b="1" dirty="0"/>
-              <a:t>Professor</a:t>
-            </a:r>
-            <a:r>
-              <a:rPr lang="en-GB" dirty="0"/>
-              <a:t> at </a:t>
-            </a:r>
-            <a:r>
-              <a:rPr lang="en-GB" b="1" dirty="0"/>
-              <a:t>UC</a:t>
-            </a:r>
-            <a:r>
-              <a:rPr lang="en-GB" dirty="0"/>
-              <a:t> </a:t>
-            </a:r>
-            <a:r>
-              <a:rPr lang="en-GB" b="1" dirty="0"/>
-              <a:t>San</a:t>
-            </a:r>
-            <a:r>
-              <a:rPr lang="en-GB" dirty="0"/>
-              <a:t> </a:t>
-            </a:r>
-            <a:r>
-              <a:rPr lang="en-GB" b="1" dirty="0"/>
-              <a:t>Diego</a:t>
-            </a:r>
-            <a:r>
-              <a:rPr lang="en-GB" dirty="0"/>
-              <a:t>, </a:t>
-            </a:r>
-            <a:r>
-              <a:rPr lang="en-GB" b="1" dirty="0">
-                <a:solidFill>
-                  <a:schemeClr val="accent2">
-                    <a:lumMod val="50000"/>
-                  </a:schemeClr>
-                </a:solidFill>
-              </a:rPr>
-              <a:t>Boltzmann</a:t>
-            </a:r>
-            <a:r>
-              <a:rPr lang="en-GB" dirty="0"/>
-              <a:t> </a:t>
-            </a:r>
-            <a:r>
-              <a:rPr lang="en-GB" b="1" dirty="0">
-                <a:solidFill>
-                  <a:schemeClr val="accent2">
-                    <a:lumMod val="50000"/>
-                  </a:schemeClr>
-                </a:solidFill>
-              </a:rPr>
-              <a:t>machines</a:t>
-            </a:r>
-            <a:r>
-              <a:rPr lang="en-GB" dirty="0"/>
-              <a:t>. </a:t>
-            </a:r>
-            <a:r>
-              <a:rPr lang="en-US" dirty="0">
-                <a:hlinkClick r:id="rId5"/>
-              </a:rPr>
-              <a:t>https://scholar.google.ca/citations?user=m1qAiOUAAAAJ&amp;hl=en</a:t>
-            </a:r>
-            <a:endParaRPr lang="en-US" dirty="0"/>
-          </a:p>
-        </p:txBody>
-      </p:sp>
-    </p:spTree>
-    <p:extLst>
-      <p:ext uri="{BB962C8B-B14F-4D97-AF65-F5344CB8AC3E}">
-        <p14:creationId xmlns:p14="http://schemas.microsoft.com/office/powerpoint/2010/main" val="3044459727"/>
-      </p:ext>
-    </p:extLst>
-  </p:cSld>
-  <p:clrMapOvr>
-    <a:masterClrMapping/>
-  </p:clrMapOvr>
-</p:sld>
-</file>
-
 <file path=ppt/slides/slide28.xml><?xml version="1.0" encoding="utf-8"?>
 <p:sld xmlns:a="http://schemas.openxmlformats.org/drawingml/2006/main" xmlns:r="http://schemas.openxmlformats.org/officeDocument/2006/relationships" xmlns:p="http://schemas.openxmlformats.org/presentationml/2006/main">
   <p:cSld>
@@ -8856,16 +8667,21 @@
             <p:ph idx="1"/>
           </p:nvPr>
         </p:nvSpPr>
-        <p:spPr/>
+        <p:spPr>
+          <a:xfrm>
+            <a:off x="838200" y="1825624"/>
+            <a:ext cx="10515600" cy="5032375"/>
+          </a:xfrm>
+        </p:spPr>
         <p:txBody>
           <a:bodyPr>
-            <a:normAutofit/>
+            <a:noAutofit/>
           </a:bodyPr>
           <a:lstStyle/>
           <a:p>
             <a:r>
-              <a:rPr lang="en-GB" b="1" dirty="0"/>
-              <a:t>Peter</a:t>
+              <a:rPr lang="en-GB" b="1" dirty="0" err="1"/>
+              <a:t>Demis</a:t>
             </a:r>
             <a:r>
               <a:rPr lang="en-GB" dirty="0"/>
@@ -8879,72 +8695,11 @@
                   </a:schemeClr>
                 </a:solidFill>
               </a:rPr>
-              <a:t>Norvig</a:t>
-            </a:r>
-            <a:r>
-              <a:rPr lang="en-GB" dirty="0"/>
-              <a:t>: </a:t>
-            </a:r>
-            <a:r>
-              <a:rPr lang="en-GB" b="1" dirty="0"/>
-              <a:t>Director</a:t>
-            </a:r>
-            <a:r>
-              <a:rPr lang="en-GB" dirty="0"/>
-              <a:t> </a:t>
-            </a:r>
-            <a:r>
-              <a:rPr lang="en-GB" b="1" dirty="0"/>
-              <a:t>of</a:t>
-            </a:r>
-            <a:r>
-              <a:rPr lang="en-GB" dirty="0"/>
-              <a:t> </a:t>
-            </a:r>
-            <a:r>
-              <a:rPr lang="en-GB" b="1" dirty="0"/>
-              <a:t>Research</a:t>
-            </a:r>
-            <a:r>
-              <a:rPr lang="en-GB" dirty="0"/>
-              <a:t> at </a:t>
-            </a:r>
-            <a:r>
-              <a:rPr lang="en-GB" b="1" dirty="0"/>
-              <a:t>Google</a:t>
-            </a:r>
-            <a:r>
-              <a:rPr lang="en-GB" dirty="0"/>
-              <a:t>, co-author of the other Bible of Deep Learning</a:t>
-            </a:r>
-            <a:br>
-              <a:rPr lang="en-GB" dirty="0"/>
-            </a:br>
-            <a:r>
-              <a:rPr lang="en-GB" dirty="0">
-                <a:hlinkClick r:id="rId2"/>
-              </a:rPr>
-              <a:t>https://scholar.google.com/citations?user=Ol0vcWgAAAAJ&amp;hl=en</a:t>
-            </a:r>
-            <a:br>
-              <a:rPr lang="en-GB" dirty="0"/>
-            </a:br>
-            <a:r>
-              <a:rPr lang="en-GB" dirty="0">
-                <a:hlinkClick r:id="rId3"/>
-              </a:rPr>
-              <a:t>http://aima.cs.berkeley.edu/</a:t>
-            </a:r>
-            <a:endParaRPr lang="en-GB" dirty="0"/>
-          </a:p>
-          <a:p>
-            <a:r>
-              <a:rPr lang="en-GB" b="1" dirty="0"/>
-              <a:t>Stuart</a:t>
-            </a:r>
-            <a:r>
-              <a:rPr lang="en-GB" dirty="0"/>
-              <a:t> </a:t>
+              <a:t>Hassabis</a:t>
+            </a:r>
+            <a:r>
+              <a:rPr lang="en-GB" dirty="0"/>
+              <a:t>: Co-founder of </a:t>
             </a:r>
             <a:r>
               <a:rPr lang="en-GB" b="1" dirty="0">
@@ -8954,55 +8709,11 @@
                   </a:schemeClr>
                 </a:solidFill>
               </a:rPr>
-              <a:t>Russell</a:t>
-            </a:r>
-            <a:r>
-              <a:rPr lang="en-GB" dirty="0"/>
-              <a:t>: </a:t>
-            </a:r>
-            <a:r>
-              <a:rPr lang="en-GB" b="1" dirty="0"/>
-              <a:t>Professor</a:t>
-            </a:r>
-            <a:r>
-              <a:rPr lang="en-GB" dirty="0"/>
-              <a:t> at </a:t>
-            </a:r>
-            <a:r>
-              <a:rPr lang="en-GB" b="1" dirty="0"/>
-              <a:t>UC</a:t>
-            </a:r>
-            <a:r>
-              <a:rPr lang="en-GB" dirty="0"/>
-              <a:t> </a:t>
-            </a:r>
-            <a:r>
-              <a:rPr lang="en-GB" b="1" dirty="0"/>
-              <a:t>Berkely</a:t>
-            </a:r>
-            <a:r>
-              <a:rPr lang="en-GB" dirty="0"/>
-              <a:t>, co-author of the other Bible of Deep Learning</a:t>
-            </a:r>
-            <a:br>
-              <a:rPr lang="en-GB" dirty="0"/>
-            </a:br>
-            <a:r>
-              <a:rPr lang="en-GB" dirty="0">
-                <a:hlinkClick r:id="rId4"/>
-              </a:rPr>
-              <a:t>https://scholar.google.com/citations?user=2oy3OXYAAAAJ&amp;hl=en</a:t>
-            </a:r>
-            <a:endParaRPr lang="en-GB" dirty="0"/>
-          </a:p>
-          <a:p>
-            <a:r>
-              <a:rPr lang="en-GB" b="1" dirty="0"/>
-              <a:t>Francois</a:t>
-            </a:r>
-            <a:r>
-              <a:rPr lang="en-GB" dirty="0"/>
-              <a:t> </a:t>
+              <a:t>DeepMind</a:t>
+            </a:r>
+            <a:r>
+              <a:rPr lang="en-GB" dirty="0"/>
+              <a:t>, </a:t>
             </a:r>
             <a:r>
               <a:rPr lang="en-GB" b="1" dirty="0">
@@ -9012,7 +8723,57 @@
                   </a:schemeClr>
                 </a:solidFill>
               </a:rPr>
-              <a:t>Chollet</a:t>
+              <a:t>AlphaGo</a:t>
+            </a:r>
+            <a:r>
+              <a:rPr lang="en-GB" dirty="0"/>
+              <a:t>. Several contributions in </a:t>
+            </a:r>
+            <a:r>
+              <a:rPr lang="en-GB" b="1" dirty="0"/>
+              <a:t>Reinforcement</a:t>
+            </a:r>
+            <a:r>
+              <a:rPr lang="en-GB" dirty="0"/>
+              <a:t> </a:t>
+            </a:r>
+            <a:r>
+              <a:rPr lang="en-GB" b="1" dirty="0"/>
+              <a:t>Learning</a:t>
+            </a:r>
+            <a:r>
+              <a:rPr lang="en-GB" dirty="0"/>
+              <a:t>.</a:t>
+            </a:r>
+            <a:br>
+              <a:rPr lang="en-GB" dirty="0"/>
+            </a:br>
+            <a:r>
+              <a:rPr lang="en-GB" dirty="0">
+                <a:hlinkClick r:id="rId2"/>
+              </a:rPr>
+              <a:t>https://scholar.google.com/citations?hl=en&amp;user=dYpPMQEAAAAJ</a:t>
+            </a:r>
+            <a:endParaRPr lang="en-GB" dirty="0"/>
+          </a:p>
+          <a:p>
+            <a:r>
+              <a:rPr lang="en-GB" b="1" dirty="0"/>
+              <a:t>Alex</a:t>
+            </a:r>
+            <a:r>
+              <a:rPr lang="en-GB" dirty="0"/>
+              <a:t> </a:t>
+            </a:r>
+            <a:r>
+              <a:rPr lang="en-GB" b="1" dirty="0">
+                <a:solidFill>
+                  <a:schemeClr val="accent2">
+                    <a:lumMod val="50000"/>
+                  </a:schemeClr>
+                </a:solidFill>
+              </a:rPr>
+              <a:t>Graves</a:t>
             </a:r>
             <a:r>
               <a:rPr lang="en-GB" dirty="0"/>
@@ -9020,7 +8781,7 @@
             </a:r>
             <a:r>
               <a:rPr lang="en-GB" b="1" dirty="0"/>
-              <a:t>Researcher</a:t>
+              <a:t>Professor</a:t>
             </a:r>
             <a:r>
               <a:rPr lang="en-GB" dirty="0"/>
@@ -9028,11 +8789,110 @@
             </a:r>
             <a:r>
               <a:rPr lang="en-GB" b="1" dirty="0"/>
-              <a:t>Google</a:t>
-            </a:r>
-            <a:r>
-              <a:rPr lang="en-GB" dirty="0"/>
-              <a:t>. The man behind the </a:t>
+              <a:t>University</a:t>
+            </a:r>
+            <a:r>
+              <a:rPr lang="en-GB" dirty="0"/>
+              <a:t> </a:t>
+            </a:r>
+            <a:r>
+              <a:rPr lang="en-GB" b="1" dirty="0"/>
+              <a:t>of</a:t>
+            </a:r>
+            <a:r>
+              <a:rPr lang="en-GB" dirty="0"/>
+              <a:t> </a:t>
+            </a:r>
+            <a:r>
+              <a:rPr lang="en-GB" b="1" dirty="0"/>
+              <a:t>Toronto</a:t>
+            </a:r>
+            <a:r>
+              <a:rPr lang="en-GB" dirty="0"/>
+              <a:t>. Several contributions in </a:t>
+            </a:r>
+            <a:r>
+              <a:rPr lang="en-GB" b="1" dirty="0"/>
+              <a:t>Reinforcement</a:t>
+            </a:r>
+            <a:r>
+              <a:rPr lang="en-GB" dirty="0"/>
+              <a:t> </a:t>
+            </a:r>
+            <a:r>
+              <a:rPr lang="en-GB" b="1" dirty="0"/>
+              <a:t>Learning</a:t>
+            </a:r>
+            <a:r>
+              <a:rPr lang="en-GB" dirty="0"/>
+              <a:t>. </a:t>
+            </a:r>
+            <a:r>
+              <a:rPr lang="en-GB" dirty="0">
+                <a:hlinkClick r:id="rId3"/>
+              </a:rPr>
+              <a:t>https://scholar.google.co.uk/citations?user=DaFHynwAAAAJ&amp;hl=en</a:t>
+            </a:r>
+            <a:endParaRPr lang="en-GB" dirty="0"/>
+          </a:p>
+          <a:p>
+            <a:r>
+              <a:rPr lang="en-GB" b="1" dirty="0"/>
+              <a:t>Michael</a:t>
+            </a:r>
+            <a:r>
+              <a:rPr lang="en-GB" dirty="0"/>
+              <a:t> </a:t>
+            </a:r>
+            <a:r>
+              <a:rPr lang="en-GB" b="1" dirty="0"/>
+              <a:t>I.</a:t>
+            </a:r>
+            <a:r>
+              <a:rPr lang="en-GB" dirty="0"/>
+              <a:t> </a:t>
+            </a:r>
+            <a:r>
+              <a:rPr lang="en-GB" b="1" dirty="0">
+                <a:solidFill>
+                  <a:schemeClr val="accent2">
+                    <a:lumMod val="50000"/>
+                  </a:schemeClr>
+                </a:solidFill>
+              </a:rPr>
+              <a:t>Jordan</a:t>
+            </a:r>
+            <a:r>
+              <a:rPr lang="en-GB" dirty="0"/>
+              <a:t>: Professor at </a:t>
+            </a:r>
+            <a:r>
+              <a:rPr lang="en-GB" b="1" dirty="0"/>
+              <a:t>UC Berkeley</a:t>
+            </a:r>
+            <a:r>
+              <a:rPr lang="en-GB" dirty="0"/>
+              <a:t>, co-inventor of LDA.</a:t>
+            </a:r>
+            <a:br>
+              <a:rPr lang="en-GB" dirty="0"/>
+            </a:br>
+            <a:r>
+              <a:rPr lang="en-GB" dirty="0">
+                <a:hlinkClick r:id="rId4"/>
+              </a:rPr>
+              <a:t>https://scholar.google.com/citations?user=yxUduqMAAAAJ&amp;hl=fr</a:t>
+            </a:r>
+            <a:endParaRPr lang="en-GB" dirty="0"/>
+          </a:p>
+          <a:p>
+            <a:r>
+              <a:rPr lang="en-GB" b="1" dirty="0"/>
+              <a:t>Terrence</a:t>
+            </a:r>
+            <a:r>
+              <a:rPr lang="en-GB" dirty="0"/>
+              <a:t> </a:t>
             </a:r>
             <a:r>
               <a:rPr lang="en-GB" b="1" dirty="0" err="1">
@@ -9042,52 +8902,86 @@
                   </a:schemeClr>
                 </a:solidFill>
               </a:rPr>
-              <a:t>Keras</a:t>
-            </a:r>
-            <a:r>
-              <a:rPr lang="en-GB" dirty="0"/>
-              <a:t> framework and </a:t>
-            </a:r>
-            <a:r>
-              <a:rPr lang="en-GB" b="1" dirty="0" err="1"/>
-              <a:t>Xception</a:t>
-            </a:r>
-            <a:r>
-              <a:rPr lang="en-GB" dirty="0"/>
-              <a:t>.</a:t>
-            </a:r>
-            <a:br>
-              <a:rPr lang="en-GB" dirty="0"/>
-            </a:br>
-            <a:r>
-              <a:rPr lang="en-GB" dirty="0">
+              <a:t>Sejnowski</a:t>
+            </a:r>
+            <a:r>
+              <a:rPr lang="en-GB" dirty="0"/>
+              <a:t>: </a:t>
+            </a:r>
+            <a:r>
+              <a:rPr lang="en-GB" b="1" dirty="0"/>
+              <a:t>Professor</a:t>
+            </a:r>
+            <a:r>
+              <a:rPr lang="en-GB" dirty="0"/>
+              <a:t> at </a:t>
+            </a:r>
+            <a:r>
+              <a:rPr lang="en-GB" b="1" dirty="0"/>
+              <a:t>UC</a:t>
+            </a:r>
+            <a:r>
+              <a:rPr lang="en-GB" dirty="0"/>
+              <a:t> </a:t>
+            </a:r>
+            <a:r>
+              <a:rPr lang="en-GB" b="1" dirty="0"/>
+              <a:t>San</a:t>
+            </a:r>
+            <a:r>
+              <a:rPr lang="en-GB" dirty="0"/>
+              <a:t> </a:t>
+            </a:r>
+            <a:r>
+              <a:rPr lang="en-GB" b="1" dirty="0"/>
+              <a:t>Diego</a:t>
+            </a:r>
+            <a:r>
+              <a:rPr lang="en-GB" dirty="0"/>
+              <a:t>, </a:t>
+            </a:r>
+            <a:r>
+              <a:rPr lang="en-GB" b="1" dirty="0">
+                <a:solidFill>
+                  <a:schemeClr val="accent2">
+                    <a:lumMod val="50000"/>
+                  </a:schemeClr>
+                </a:solidFill>
+              </a:rPr>
+              <a:t>Boltzmann</a:t>
+            </a:r>
+            <a:r>
+              <a:rPr lang="en-GB" dirty="0"/>
+              <a:t> </a:t>
+            </a:r>
+            <a:r>
+              <a:rPr lang="en-GB" b="1" dirty="0">
+                <a:solidFill>
+                  <a:schemeClr val="accent2">
+                    <a:lumMod val="50000"/>
+                  </a:schemeClr>
+                </a:solidFill>
+              </a:rPr>
+              <a:t>machines</a:t>
+            </a:r>
+            <a:r>
+              <a:rPr lang="en-GB" dirty="0"/>
+              <a:t>. </a:t>
+            </a:r>
+            <a:r>
+              <a:rPr lang="en-US" dirty="0">
                 <a:hlinkClick r:id="rId5"/>
               </a:rPr>
-              <a:t>https://scholar.google.com/citations?user=VfYhf2wAAAAJ&amp;hl=en</a:t>
-            </a:r>
-            <a:endParaRPr lang="en-GB" dirty="0"/>
-          </a:p>
-          <a:p>
-            <a:endParaRPr lang="en-GB" dirty="0"/>
-          </a:p>
-          <a:p>
+              <a:t>https://scholar.google.ca/citations?user=m1qAiOUAAAAJ&amp;hl=en</a:t>
+            </a:r>
             <a:endParaRPr lang="en-US" dirty="0"/>
-          </a:p>
-          <a:p>
-            <a:endParaRPr lang="en-US" dirty="0"/>
-          </a:p>
-          <a:p>
-            <a:endParaRPr lang="en-US" dirty="0"/>
-          </a:p>
-          <a:p>
-            <a:endParaRPr lang="en-GB" dirty="0"/>
           </a:p>
         </p:txBody>
       </p:sp>
     </p:spTree>
     <p:extLst>
       <p:ext uri="{BB962C8B-B14F-4D97-AF65-F5344CB8AC3E}">
-        <p14:creationId xmlns:p14="http://schemas.microsoft.com/office/powerpoint/2010/main" val="213952004"/>
+        <p14:creationId xmlns:p14="http://schemas.microsoft.com/office/powerpoint/2010/main" val="3044459727"/>
       </p:ext>
     </p:extLst>
   </p:cSld>
@@ -9167,12 +9061,7 @@
             <p:ph idx="1"/>
           </p:nvPr>
         </p:nvSpPr>
-        <p:spPr>
-          <a:xfrm>
-            <a:off x="838200" y="1825624"/>
-            <a:ext cx="10515600" cy="5032375"/>
-          </a:xfrm>
-        </p:spPr>
+        <p:spPr/>
         <p:txBody>
           <a:bodyPr>
             <a:normAutofit/>
@@ -9180,75 +9069,175 @@
           <a:lstStyle/>
           <a:p>
             <a:r>
-              <a:rPr lang="en-US" b="1" dirty="0"/>
-              <a:t>Trevor </a:t>
-            </a:r>
-            <a:r>
-              <a:rPr lang="en-US" b="1" dirty="0">
+              <a:rPr lang="en-GB" b="1" dirty="0"/>
+              <a:t>Peter</a:t>
+            </a:r>
+            <a:r>
+              <a:rPr lang="en-GB" dirty="0"/>
+              <a:t> </a:t>
+            </a:r>
+            <a:r>
+              <a:rPr lang="en-GB" b="1" dirty="0">
                 <a:solidFill>
                   <a:schemeClr val="accent2">
                     <a:lumMod val="50000"/>
                   </a:schemeClr>
                 </a:solidFill>
               </a:rPr>
-              <a:t>Hastie</a:t>
-            </a:r>
-            <a:r>
-              <a:rPr lang="en-US" dirty="0"/>
+              <a:t>Norvig</a:t>
+            </a:r>
+            <a:r>
+              <a:rPr lang="en-GB" dirty="0"/>
               <a:t>: </a:t>
             </a:r>
             <a:r>
-              <a:rPr lang="en-US" b="1" dirty="0"/>
-              <a:t>Professor</a:t>
-            </a:r>
-            <a:r>
-              <a:rPr lang="en-US" dirty="0"/>
+              <a:rPr lang="en-GB" b="1" dirty="0"/>
+              <a:t>Director</a:t>
+            </a:r>
+            <a:r>
+              <a:rPr lang="en-GB" dirty="0"/>
+              <a:t> </a:t>
+            </a:r>
+            <a:r>
+              <a:rPr lang="en-GB" b="1" dirty="0"/>
+              <a:t>of</a:t>
+            </a:r>
+            <a:r>
+              <a:rPr lang="en-GB" dirty="0"/>
+              <a:t> </a:t>
+            </a:r>
+            <a:r>
+              <a:rPr lang="en-GB" b="1" dirty="0"/>
+              <a:t>Research</a:t>
+            </a:r>
+            <a:r>
+              <a:rPr lang="en-GB" dirty="0"/>
               <a:t> at </a:t>
             </a:r>
             <a:r>
-              <a:rPr lang="en-US" b="1" dirty="0"/>
-              <a:t>Stanford</a:t>
-            </a:r>
-            <a:r>
-              <a:rPr lang="en-US" dirty="0"/>
-              <a:t>, co-</a:t>
-            </a:r>
-            <a:r>
-              <a:rPr lang="en-US" dirty="0" err="1"/>
-              <a:t>autor</a:t>
-            </a:r>
-            <a:r>
-              <a:rPr lang="en-US" dirty="0"/>
-              <a:t> of the Bible of Statistical Learning.</a:t>
+              <a:rPr lang="en-GB" b="1" dirty="0"/>
+              <a:t>Google</a:t>
+            </a:r>
+            <a:r>
+              <a:rPr lang="en-GB" dirty="0"/>
+              <a:t>, co-author of the other Bible of Deep Learning</a:t>
             </a:r>
             <a:br>
-              <a:rPr lang="en-US" dirty="0"/>
+              <a:rPr lang="en-GB" dirty="0"/>
             </a:br>
             <a:r>
-              <a:rPr lang="en-US" dirty="0">
+              <a:rPr lang="en-GB" dirty="0">
                 <a:hlinkClick r:id="rId2"/>
               </a:rPr>
-              <a:t>https://scholar.google.ca/citations?user=tQVe-fAAAAAJ&amp;hl=en</a:t>
+              <a:t>https://scholar.google.com/citations?user=Ol0vcWgAAAAJ&amp;hl=en</a:t>
             </a:r>
             <a:br>
-              <a:rPr lang="en-US" dirty="0"/>
+              <a:rPr lang="en-GB" dirty="0"/>
             </a:br>
             <a:r>
-              <a:rPr lang="en-US" dirty="0">
+              <a:rPr lang="en-GB" dirty="0">
                 <a:hlinkClick r:id="rId3"/>
               </a:rPr>
-              <a:t>https://hastie.su.domains/ElemStatLearn/download.html</a:t>
-            </a:r>
-            <a:endParaRPr lang="en-US" dirty="0"/>
+              <a:t>http://aima.cs.berkeley.edu/</a:t>
+            </a:r>
+            <a:endParaRPr lang="en-GB" dirty="0"/>
           </a:p>
           <a:p>
             <a:r>
               <a:rPr lang="en-GB" b="1" dirty="0"/>
-              <a:t>Robert</a:t>
+              <a:t>Stuart</a:t>
             </a:r>
             <a:r>
               <a:rPr lang="en-GB" dirty="0"/>
               <a:t> </a:t>
+            </a:r>
+            <a:r>
+              <a:rPr lang="en-GB" b="1" dirty="0">
+                <a:solidFill>
+                  <a:schemeClr val="accent2">
+                    <a:lumMod val="50000"/>
+                  </a:schemeClr>
+                </a:solidFill>
+              </a:rPr>
+              <a:t>Russell</a:t>
+            </a:r>
+            <a:r>
+              <a:rPr lang="en-GB" dirty="0"/>
+              <a:t>: </a:t>
+            </a:r>
+            <a:r>
+              <a:rPr lang="en-GB" b="1" dirty="0"/>
+              <a:t>Professor</a:t>
+            </a:r>
+            <a:r>
+              <a:rPr lang="en-GB" dirty="0"/>
+              <a:t> at </a:t>
+            </a:r>
+            <a:r>
+              <a:rPr lang="en-GB" b="1" dirty="0"/>
+              <a:t>UC</a:t>
+            </a:r>
+            <a:r>
+              <a:rPr lang="en-GB" dirty="0"/>
+              <a:t> </a:t>
+            </a:r>
+            <a:r>
+              <a:rPr lang="en-GB" b="1" dirty="0"/>
+              <a:t>Berkely</a:t>
+            </a:r>
+            <a:r>
+              <a:rPr lang="en-GB" dirty="0"/>
+              <a:t>, co-author of the other Bible of Deep Learning</a:t>
+            </a:r>
+            <a:br>
+              <a:rPr lang="en-GB" dirty="0"/>
+            </a:br>
+            <a:r>
+              <a:rPr lang="en-GB" dirty="0">
+                <a:hlinkClick r:id="rId4"/>
+              </a:rPr>
+              <a:t>https://scholar.google.com/citations?user=2oy3OXYAAAAJ&amp;hl=en</a:t>
+            </a:r>
+            <a:endParaRPr lang="en-GB" dirty="0"/>
+          </a:p>
+          <a:p>
+            <a:r>
+              <a:rPr lang="en-GB" b="1" dirty="0"/>
+              <a:t>Francois</a:t>
+            </a:r>
+            <a:r>
+              <a:rPr lang="en-GB" dirty="0"/>
+              <a:t> </a:t>
+            </a:r>
+            <a:r>
+              <a:rPr lang="en-GB" b="1" dirty="0">
+                <a:solidFill>
+                  <a:schemeClr val="accent2">
+                    <a:lumMod val="50000"/>
+                  </a:schemeClr>
+                </a:solidFill>
+              </a:rPr>
+              <a:t>Chollet</a:t>
+            </a:r>
+            <a:r>
+              <a:rPr lang="en-GB" dirty="0"/>
+              <a:t>: </a:t>
+            </a:r>
+            <a:r>
+              <a:rPr lang="en-GB" b="1" dirty="0"/>
+              <a:t>Researcher</a:t>
+            </a:r>
+            <a:r>
+              <a:rPr lang="en-GB" dirty="0"/>
+              <a:t> at </a:t>
+            </a:r>
+            <a:r>
+              <a:rPr lang="en-GB" b="1" dirty="0"/>
+              <a:t>Google</a:t>
+            </a:r>
+            <a:r>
+              <a:rPr lang="en-GB" dirty="0"/>
+              <a:t>. The man behind the </a:t>
             </a:r>
             <a:r>
               <a:rPr lang="en-GB" b="1" dirty="0" err="1">
@@ -9258,137 +9247,35 @@
                   </a:schemeClr>
                 </a:solidFill>
               </a:rPr>
-              <a:t>Tibshirani</a:t>
-            </a:r>
-            <a:r>
-              <a:rPr lang="en-US" dirty="0"/>
-              <a:t>: </a:t>
-            </a:r>
-            <a:r>
-              <a:rPr lang="en-US" b="1" dirty="0"/>
-              <a:t>Professor</a:t>
-            </a:r>
-            <a:r>
-              <a:rPr lang="en-US" dirty="0"/>
-              <a:t> at </a:t>
-            </a:r>
-            <a:r>
-              <a:rPr lang="en-US" b="1" dirty="0"/>
-              <a:t>Stanford</a:t>
-            </a:r>
-            <a:r>
-              <a:rPr lang="en-US" dirty="0"/>
-              <a:t>, co-</a:t>
-            </a:r>
-            <a:r>
-              <a:rPr lang="en-US" dirty="0" err="1"/>
-              <a:t>autor</a:t>
-            </a:r>
-            <a:r>
-              <a:rPr lang="en-US" dirty="0"/>
-              <a:t> of the Bible of Statistical Learning. Inventor of the LASSO algorithm.</a:t>
+              <a:t>Keras</a:t>
+            </a:r>
+            <a:r>
+              <a:rPr lang="en-GB" dirty="0"/>
+              <a:t> framework and </a:t>
+            </a:r>
+            <a:r>
+              <a:rPr lang="en-GB" b="1" dirty="0" err="1"/>
+              <a:t>Xception</a:t>
+            </a:r>
+            <a:r>
+              <a:rPr lang="en-GB" dirty="0"/>
+              <a:t>.</a:t>
             </a:r>
             <a:br>
-              <a:rPr lang="en-US" dirty="0"/>
+              <a:rPr lang="en-GB" dirty="0"/>
             </a:br>
             <a:r>
-              <a:rPr lang="en-US" dirty="0">
-                <a:hlinkClick r:id="rId4"/>
-              </a:rPr>
-              <a:t>https://scholar.google.ca/citations?user=ZpG_cJwAAAAJ&amp;hl=en</a:t>
-            </a:r>
-            <a:endParaRPr lang="en-US" dirty="0"/>
-          </a:p>
-          <a:p>
-            <a:r>
-              <a:rPr lang="en-GB" b="1" dirty="0"/>
-              <a:t>Vladimir </a:t>
-            </a:r>
-            <a:r>
-              <a:rPr lang="en-GB" b="1" dirty="0" err="1">
-                <a:solidFill>
-                  <a:schemeClr val="accent2">
-                    <a:lumMod val="50000"/>
-                  </a:schemeClr>
-                </a:solidFill>
-              </a:rPr>
-              <a:t>Vapnik</a:t>
-            </a:r>
-            <a:r>
-              <a:rPr lang="en-GB" b="1" dirty="0"/>
-              <a:t>: Retired Professor</a:t>
-            </a:r>
-            <a:r>
-              <a:rPr lang="en-GB" dirty="0"/>
-              <a:t>, inventor of </a:t>
-            </a:r>
-            <a:r>
-              <a:rPr lang="en-GB" b="1" dirty="0"/>
-              <a:t>SVMs</a:t>
-            </a:r>
-            <a:r>
-              <a:rPr lang="en-GB" dirty="0"/>
-              <a:t> and many other concepts. Worked with </a:t>
-            </a:r>
-            <a:r>
-              <a:rPr lang="en-GB" b="1" dirty="0"/>
-              <a:t>Yann</a:t>
-            </a:r>
-            <a:r>
-              <a:rPr lang="en-GB" dirty="0"/>
-              <a:t> </a:t>
-            </a:r>
-            <a:r>
-              <a:rPr lang="en-GB" b="1" dirty="0" err="1">
-                <a:solidFill>
-                  <a:schemeClr val="accent2">
-                    <a:lumMod val="50000"/>
-                  </a:schemeClr>
-                </a:solidFill>
-              </a:rPr>
-              <a:t>LeCun</a:t>
-            </a:r>
-            <a:r>
-              <a:rPr lang="en-GB" dirty="0"/>
-              <a:t> at </a:t>
-            </a:r>
-            <a:r>
-              <a:rPr lang="en-GB" b="1" dirty="0">
-                <a:solidFill>
-                  <a:schemeClr val="accent2">
-                    <a:lumMod val="50000"/>
-                  </a:schemeClr>
-                </a:solidFill>
-              </a:rPr>
-              <a:t>Facebook</a:t>
-            </a:r>
-            <a:r>
-              <a:rPr lang="en-GB" b="1" dirty="0"/>
-              <a:t> </a:t>
-            </a:r>
-            <a:r>
-              <a:rPr lang="en-GB" b="1" dirty="0">
-                <a:solidFill>
-                  <a:schemeClr val="accent2">
-                    <a:lumMod val="50000"/>
-                  </a:schemeClr>
-                </a:solidFill>
-              </a:rPr>
-              <a:t>AI</a:t>
-            </a:r>
-            <a:r>
-              <a:rPr lang="en-GB" dirty="0"/>
-              <a:t>.</a:t>
-            </a:r>
-            <a:br>
-              <a:rPr lang="en-GB" dirty="0"/>
-            </a:br>
-            <a:r>
-              <a:rPr lang="en-US" dirty="0">
+              <a:rPr lang="en-GB" dirty="0">
                 <a:hlinkClick r:id="rId5"/>
               </a:rPr>
-              <a:t>https://scholar.google.com/citations?user=vtegaJgAAAAJ&amp;hl=fr</a:t>
-            </a:r>
+              <a:t>https://scholar.google.com/citations?user=VfYhf2wAAAAJ&amp;hl=en</a:t>
+            </a:r>
+            <a:endParaRPr lang="en-GB" dirty="0"/>
+          </a:p>
+          <a:p>
+            <a:endParaRPr lang="en-GB" dirty="0"/>
+          </a:p>
+          <a:p>
             <a:endParaRPr lang="en-US" dirty="0"/>
           </a:p>
           <a:p>
@@ -9405,7 +9292,7 @@
     </p:spTree>
     <p:extLst>
       <p:ext uri="{BB962C8B-B14F-4D97-AF65-F5344CB8AC3E}">
-        <p14:creationId xmlns:p14="http://schemas.microsoft.com/office/powerpoint/2010/main" val="1934179735"/>
+        <p14:creationId xmlns:p14="http://schemas.microsoft.com/office/powerpoint/2010/main" val="213952004"/>
       </p:ext>
     </p:extLst>
   </p:cSld>
@@ -9581,17 +9468,182 @@
         </p:spPr>
         <p:txBody>
           <a:bodyPr>
-            <a:normAutofit lnSpcReduction="10000"/>
+            <a:normAutofit/>
           </a:bodyPr>
           <a:lstStyle/>
           <a:p>
             <a:r>
+              <a:rPr lang="en-US" b="1" dirty="0"/>
+              <a:t>Trevor </a:t>
+            </a:r>
+            <a:r>
+              <a:rPr lang="en-US" b="1" dirty="0">
+                <a:solidFill>
+                  <a:schemeClr val="accent2">
+                    <a:lumMod val="50000"/>
+                  </a:schemeClr>
+                </a:solidFill>
+              </a:rPr>
+              <a:t>Hastie</a:t>
+            </a:r>
+            <a:r>
+              <a:rPr lang="en-US" dirty="0"/>
+              <a:t>: </a:t>
+            </a:r>
+            <a:r>
+              <a:rPr lang="en-US" b="1" dirty="0"/>
+              <a:t>Professor</a:t>
+            </a:r>
+            <a:r>
+              <a:rPr lang="en-US" dirty="0"/>
+              <a:t> at </a:t>
+            </a:r>
+            <a:r>
+              <a:rPr lang="en-US" b="1" dirty="0"/>
+              <a:t>Stanford</a:t>
+            </a:r>
+            <a:r>
+              <a:rPr lang="en-US" dirty="0"/>
+              <a:t>, co-</a:t>
+            </a:r>
+            <a:r>
+              <a:rPr lang="en-US" dirty="0" err="1"/>
+              <a:t>autor</a:t>
+            </a:r>
+            <a:r>
+              <a:rPr lang="en-US" dirty="0"/>
+              <a:t> of the Bible of Statistical Learning.</a:t>
+            </a:r>
+            <a:br>
+              <a:rPr lang="en-US" dirty="0"/>
+            </a:br>
+            <a:r>
+              <a:rPr lang="en-US" dirty="0">
+                <a:hlinkClick r:id="rId2"/>
+              </a:rPr>
+              <a:t>https://scholar.google.ca/citations?user=tQVe-fAAAAAJ&amp;hl=en</a:t>
+            </a:r>
+            <a:br>
+              <a:rPr lang="en-US" dirty="0"/>
+            </a:br>
+            <a:r>
+              <a:rPr lang="en-US" dirty="0">
+                <a:hlinkClick r:id="rId3"/>
+              </a:rPr>
+              <a:t>https://hastie.su.domains/ElemStatLearn/download.html</a:t>
+            </a:r>
+            <a:endParaRPr lang="en-US" dirty="0"/>
+          </a:p>
+          <a:p>
+            <a:r>
               <a:rPr lang="en-GB" b="1" dirty="0"/>
-              <a:t>Fred</a:t>
+              <a:t>Robert</a:t>
             </a:r>
             <a:r>
               <a:rPr lang="en-GB" dirty="0"/>
               <a:t> </a:t>
+            </a:r>
+            <a:r>
+              <a:rPr lang="en-GB" b="1" dirty="0" err="1">
+                <a:solidFill>
+                  <a:schemeClr val="accent2">
+                    <a:lumMod val="50000"/>
+                  </a:schemeClr>
+                </a:solidFill>
+              </a:rPr>
+              <a:t>Tibshirani</a:t>
+            </a:r>
+            <a:r>
+              <a:rPr lang="en-US" dirty="0"/>
+              <a:t>: </a:t>
+            </a:r>
+            <a:r>
+              <a:rPr lang="en-US" b="1" dirty="0"/>
+              <a:t>Professor</a:t>
+            </a:r>
+            <a:r>
+              <a:rPr lang="en-US" dirty="0"/>
+              <a:t> at </a:t>
+            </a:r>
+            <a:r>
+              <a:rPr lang="en-US" b="1" dirty="0"/>
+              <a:t>Stanford</a:t>
+            </a:r>
+            <a:r>
+              <a:rPr lang="en-US" dirty="0"/>
+              <a:t>, co-</a:t>
+            </a:r>
+            <a:r>
+              <a:rPr lang="en-US" dirty="0" err="1"/>
+              <a:t>autor</a:t>
+            </a:r>
+            <a:r>
+              <a:rPr lang="en-US" dirty="0"/>
+              <a:t> of the Bible of Statistical Learning. Inventor of the LASSO algorithm.</a:t>
+            </a:r>
+            <a:br>
+              <a:rPr lang="en-US" dirty="0"/>
+            </a:br>
+            <a:r>
+              <a:rPr lang="en-US" dirty="0">
+                <a:hlinkClick r:id="rId4"/>
+              </a:rPr>
+              <a:t>https://scholar.google.ca/citations?user=ZpG_cJwAAAAJ&amp;hl=en</a:t>
+            </a:r>
+            <a:endParaRPr lang="en-US" dirty="0"/>
+          </a:p>
+          <a:p>
+            <a:r>
+              <a:rPr lang="en-GB" b="1" dirty="0"/>
+              <a:t>Vladimir </a:t>
+            </a:r>
+            <a:r>
+              <a:rPr lang="en-GB" b="1" dirty="0" err="1">
+                <a:solidFill>
+                  <a:schemeClr val="accent2">
+                    <a:lumMod val="50000"/>
+                  </a:schemeClr>
+                </a:solidFill>
+              </a:rPr>
+              <a:t>Vapnik</a:t>
+            </a:r>
+            <a:r>
+              <a:rPr lang="en-GB" b="1" dirty="0"/>
+              <a:t>: Retired Professor</a:t>
+            </a:r>
+            <a:r>
+              <a:rPr lang="en-GB" dirty="0"/>
+              <a:t>, inventor of </a:t>
+            </a:r>
+            <a:r>
+              <a:rPr lang="en-GB" b="1" dirty="0"/>
+              <a:t>SVMs</a:t>
+            </a:r>
+            <a:r>
+              <a:rPr lang="en-GB" dirty="0"/>
+              <a:t> and many other concepts. Worked with </a:t>
+            </a:r>
+            <a:r>
+              <a:rPr lang="en-GB" b="1" dirty="0"/>
+              <a:t>Yann</a:t>
+            </a:r>
+            <a:r>
+              <a:rPr lang="en-GB" dirty="0"/>
+              <a:t> </a:t>
+            </a:r>
+            <a:r>
+              <a:rPr lang="en-GB" b="1" dirty="0" err="1">
+                <a:solidFill>
+                  <a:schemeClr val="accent2">
+                    <a:lumMod val="50000"/>
+                  </a:schemeClr>
+                </a:solidFill>
+              </a:rPr>
+              <a:t>LeCun</a:t>
+            </a:r>
+            <a:r>
+              <a:rPr lang="en-GB" dirty="0"/>
+              <a:t> at </a:t>
             </a:r>
             <a:r>
               <a:rPr lang="en-GB" b="1" dirty="0">
@@ -9601,125 +9653,11 @@
                   </a:schemeClr>
                 </a:solidFill>
               </a:rPr>
-              <a:t>Cummins</a:t>
-            </a:r>
-            <a:r>
-              <a:rPr lang="en-GB" dirty="0"/>
-              <a:t>: </a:t>
+              <a:t>Facebook</a:t>
             </a:r>
             <a:r>
               <a:rPr lang="en-GB" b="1" dirty="0"/>
-              <a:t>Professor</a:t>
-            </a:r>
-            <a:r>
-              <a:rPr lang="en-GB" dirty="0"/>
-              <a:t> at </a:t>
-            </a:r>
-            <a:r>
-              <a:rPr lang="en-GB" b="1" dirty="0"/>
-              <a:t>University</a:t>
-            </a:r>
-            <a:r>
-              <a:rPr lang="en-GB" dirty="0"/>
               <a:t> </a:t>
-            </a:r>
-            <a:r>
-              <a:rPr lang="en-GB" b="1" dirty="0"/>
-              <a:t>College</a:t>
-            </a:r>
-            <a:r>
-              <a:rPr lang="en-GB" dirty="0"/>
-              <a:t> </a:t>
-            </a:r>
-            <a:r>
-              <a:rPr lang="en-GB" b="1" dirty="0"/>
-              <a:t>Dublin</a:t>
-            </a:r>
-            <a:r>
-              <a:rPr lang="en-GB" dirty="0"/>
-              <a:t>, contributions to </a:t>
-            </a:r>
-            <a:r>
-              <a:rPr lang="en-GB" b="1" dirty="0"/>
-              <a:t>LSTMs</a:t>
-            </a:r>
-            <a:r>
-              <a:rPr lang="en-GB" dirty="0"/>
-              <a:t> and </a:t>
-            </a:r>
-            <a:r>
-              <a:rPr lang="en-GB" b="1" dirty="0"/>
-              <a:t>NLP</a:t>
-            </a:r>
-            <a:r>
-              <a:rPr lang="en-GB" dirty="0"/>
-              <a:t>.</a:t>
-            </a:r>
-            <a:br>
-              <a:rPr lang="en-GB" dirty="0"/>
-            </a:br>
-            <a:r>
-              <a:rPr lang="en-GB" dirty="0">
-                <a:hlinkClick r:id="rId2"/>
-              </a:rPr>
-              <a:t>https://scholar.google.com/citations?user=E-vg2zQAAAAJ&amp;hl=fr</a:t>
-            </a:r>
-            <a:endParaRPr lang="en-GB" b="1" dirty="0"/>
-          </a:p>
-          <a:p>
-            <a:r>
-              <a:rPr lang="en-GB" b="1" dirty="0"/>
-              <a:t>Andrej</a:t>
-            </a:r>
-            <a:r>
-              <a:rPr lang="en-GB" dirty="0"/>
-              <a:t> </a:t>
-            </a:r>
-            <a:r>
-              <a:rPr lang="en-GB" b="1" dirty="0" err="1">
-                <a:solidFill>
-                  <a:schemeClr val="accent2">
-                    <a:lumMod val="50000"/>
-                  </a:schemeClr>
-                </a:solidFill>
-              </a:rPr>
-              <a:t>Karpathy</a:t>
-            </a:r>
-            <a:r>
-              <a:rPr lang="en-GB" dirty="0"/>
-              <a:t>: </a:t>
-            </a:r>
-            <a:r>
-              <a:rPr lang="en-GB" b="1" dirty="0"/>
-              <a:t>Former</a:t>
-            </a:r>
-            <a:r>
-              <a:rPr lang="en-GB" dirty="0"/>
-              <a:t> </a:t>
-            </a:r>
-            <a:r>
-              <a:rPr lang="en-GB" b="1" dirty="0"/>
-              <a:t>Director</a:t>
-            </a:r>
-            <a:r>
-              <a:rPr lang="en-GB" dirty="0"/>
-              <a:t> </a:t>
-            </a:r>
-            <a:r>
-              <a:rPr lang="en-GB" b="1" dirty="0"/>
-              <a:t>of</a:t>
-            </a:r>
-            <a:r>
-              <a:rPr lang="en-GB" dirty="0"/>
-              <a:t> </a:t>
-            </a:r>
-            <a:r>
-              <a:rPr lang="en-GB" b="1" dirty="0"/>
-              <a:t>AI</a:t>
-            </a:r>
-            <a:r>
-              <a:rPr lang="en-GB" dirty="0"/>
-              <a:t> at </a:t>
             </a:r>
             <a:r>
               <a:rPr lang="en-GB" b="1" dirty="0">
@@ -9729,171 +9667,38 @@
                   </a:schemeClr>
                 </a:solidFill>
               </a:rPr>
-              <a:t>Tesla</a:t>
-            </a:r>
-            <a:r>
-              <a:rPr lang="en-GB" dirty="0"/>
-              <a:t>. Many contributions to Computer Vision (</a:t>
-            </a:r>
-            <a:r>
-              <a:rPr lang="en-GB" b="1" dirty="0" err="1"/>
-              <a:t>Imagenet</a:t>
-            </a:r>
-            <a:r>
-              <a:rPr lang="en-GB" dirty="0"/>
-              <a:t>) and NLP (</a:t>
-            </a:r>
-            <a:r>
-              <a:rPr lang="en-GB" b="1" dirty="0"/>
-              <a:t>RNNs</a:t>
-            </a:r>
-            <a:r>
-              <a:rPr lang="en-GB" dirty="0"/>
-              <a:t>).</a:t>
+              <a:t>AI</a:t>
+            </a:r>
+            <a:r>
+              <a:rPr lang="en-GB" dirty="0"/>
+              <a:t>.</a:t>
             </a:r>
             <a:br>
               <a:rPr lang="en-GB" dirty="0"/>
             </a:br>
             <a:r>
-              <a:rPr lang="en-GB" dirty="0"/>
-              <a:t>(Probably better to follow him than Elon Musk.)</a:t>
-            </a:r>
-            <a:br>
-              <a:rPr lang="en-GB" dirty="0"/>
-            </a:br>
-            <a:r>
-              <a:rPr lang="en-GB" dirty="0">
-                <a:hlinkClick r:id="rId3"/>
-              </a:rPr>
-              <a:t>https://scholar.google.com/citations?user=l8WuQJgAAAAJ&amp;hl=fr</a:t>
-            </a:r>
-            <a:endParaRPr lang="en-GB" dirty="0"/>
-          </a:p>
-          <a:p>
-            <a:r>
-              <a:rPr lang="en-GB" b="1" dirty="0"/>
-              <a:t>Li</a:t>
-            </a:r>
-            <a:r>
-              <a:rPr lang="en-GB" dirty="0"/>
-              <a:t> </a:t>
-            </a:r>
-            <a:r>
-              <a:rPr lang="en-GB" b="1" dirty="0">
-                <a:solidFill>
-                  <a:schemeClr val="accent2">
-                    <a:lumMod val="50000"/>
-                  </a:schemeClr>
-                </a:solidFill>
-              </a:rPr>
-              <a:t>Fei-Fei</a:t>
-            </a:r>
-            <a:r>
-              <a:rPr lang="en-GB" dirty="0"/>
-              <a:t>: </a:t>
-            </a:r>
-            <a:r>
-              <a:rPr lang="en-GB" b="1" dirty="0"/>
-              <a:t>Professor</a:t>
-            </a:r>
-            <a:r>
-              <a:rPr lang="en-GB" dirty="0"/>
-              <a:t> at </a:t>
-            </a:r>
-            <a:r>
-              <a:rPr lang="en-GB" b="1" dirty="0"/>
-              <a:t>Stanford</a:t>
-            </a:r>
-            <a:r>
-              <a:rPr lang="en-GB" dirty="0"/>
-              <a:t>. Many contributions to Computer Vision (</a:t>
-            </a:r>
-            <a:r>
-              <a:rPr lang="en-GB" b="1" dirty="0" err="1"/>
-              <a:t>Imagenet</a:t>
-            </a:r>
-            <a:r>
-              <a:rPr lang="en-GB" dirty="0"/>
-              <a:t>).</a:t>
-            </a:r>
-            <a:br>
-              <a:rPr lang="en-GB" dirty="0"/>
-            </a:br>
-            <a:r>
-              <a:rPr lang="en-GB" dirty="0">
-                <a:hlinkClick r:id="rId4"/>
-              </a:rPr>
-              <a:t>https://scholar.google.com/citations?user=rDfyQnIAAAAJ&amp;hl=fr</a:t>
-            </a:r>
-            <a:endParaRPr lang="en-GB" dirty="0"/>
-          </a:p>
-          <a:p>
-            <a:r>
-              <a:rPr lang="en-GB" b="1" dirty="0"/>
-              <a:t>Pieter</a:t>
-            </a:r>
-            <a:r>
-              <a:rPr lang="en-GB" dirty="0"/>
-              <a:t> </a:t>
-            </a:r>
-            <a:r>
-              <a:rPr lang="en-GB" b="1" dirty="0" err="1">
-                <a:solidFill>
-                  <a:schemeClr val="accent2">
-                    <a:lumMod val="50000"/>
-                  </a:schemeClr>
-                </a:solidFill>
-              </a:rPr>
-              <a:t>Abbeel</a:t>
-            </a:r>
-            <a:r>
-              <a:rPr lang="en-GB" dirty="0"/>
-              <a:t>: </a:t>
-            </a:r>
-            <a:r>
-              <a:rPr lang="en-GB" b="1" dirty="0"/>
-              <a:t>Professor</a:t>
-            </a:r>
-            <a:r>
-              <a:rPr lang="en-GB" dirty="0"/>
-              <a:t> at </a:t>
-            </a:r>
-            <a:r>
-              <a:rPr lang="en-GB" b="1" dirty="0"/>
-              <a:t>UC</a:t>
-            </a:r>
-            <a:r>
-              <a:rPr lang="en-GB" dirty="0"/>
-              <a:t> </a:t>
-            </a:r>
-            <a:r>
-              <a:rPr lang="en-GB" b="1" dirty="0"/>
-              <a:t>Berkeley</a:t>
-            </a:r>
-            <a:r>
-              <a:rPr lang="en-GB" dirty="0"/>
-              <a:t>, and a leading researcher in reinforcement learning and robotics.</a:t>
-            </a:r>
-            <a:br>
-              <a:rPr lang="en-GB" dirty="0"/>
-            </a:br>
-            <a:r>
-              <a:rPr lang="en-GB" dirty="0">
+              <a:rPr lang="en-US" dirty="0">
                 <a:hlinkClick r:id="rId5"/>
               </a:rPr>
-              <a:t>https://scholar.google.com/citations?user=vtwH6GkAAAAJ&amp;hl=en</a:t>
-            </a:r>
-            <a:r>
-              <a:rPr lang="en-GB" dirty="0"/>
-              <a:t> </a:t>
-            </a:r>
+              <a:t>https://scholar.google.com/citations?user=vtegaJgAAAAJ&amp;hl=fr</a:t>
+            </a:r>
+            <a:endParaRPr lang="en-US" dirty="0"/>
+          </a:p>
+          <a:p>
+            <a:endParaRPr lang="en-US" dirty="0"/>
+          </a:p>
+          <a:p>
+            <a:endParaRPr lang="en-US" dirty="0"/>
+          </a:p>
+          <a:p>
+            <a:endParaRPr lang="en-GB" dirty="0"/>
           </a:p>
         </p:txBody>
       </p:sp>
     </p:spTree>
     <p:extLst>
       <p:ext uri="{BB962C8B-B14F-4D97-AF65-F5344CB8AC3E}">
-        <p14:creationId xmlns:p14="http://schemas.microsoft.com/office/powerpoint/2010/main" val="3324188887"/>
+        <p14:creationId xmlns:p14="http://schemas.microsoft.com/office/powerpoint/2010/main" val="1934179735"/>
       </p:ext>
     </p:extLst>
   </p:cSld>
@@ -9981,21 +9786,17 @@
         </p:spPr>
         <p:txBody>
           <a:bodyPr>
-            <a:normAutofit/>
+            <a:normAutofit lnSpcReduction="10000"/>
           </a:bodyPr>
           <a:lstStyle/>
           <a:p>
             <a:r>
               <a:rPr lang="en-GB" b="1" dirty="0"/>
-              <a:t>Anil</a:t>
+              <a:t>Fred</a:t>
             </a:r>
             <a:r>
               <a:rPr lang="en-GB" dirty="0"/>
               <a:t> </a:t>
-            </a:r>
-            <a:r>
-              <a:rPr lang="en-GB" b="1" dirty="0"/>
-              <a:t>K. </a:t>
             </a:r>
             <a:r>
               <a:rPr lang="en-GB" b="1" dirty="0">
@@ -10005,7 +9806,7 @@
                   </a:schemeClr>
                 </a:solidFill>
               </a:rPr>
-              <a:t>Jain</a:t>
+              <a:t>Cummins</a:t>
             </a:r>
             <a:r>
               <a:rPr lang="en-GB" dirty="0"/>
@@ -10021,7 +9822,7 @@
             </a:r>
             <a:r>
               <a:rPr lang="en-GB" b="1" dirty="0"/>
-              <a:t>Michigan</a:t>
+              <a:t>University</a:t>
             </a:r>
             <a:r>
               <a:rPr lang="en-GB" dirty="0"/>
@@ -10029,7 +9830,7 @@
             </a:r>
             <a:r>
               <a:rPr lang="en-GB" b="1" dirty="0"/>
-              <a:t>State</a:t>
+              <a:t>College</a:t>
             </a:r>
             <a:r>
               <a:rPr lang="en-GB" dirty="0"/>
@@ -10037,11 +9838,27 @@
             </a:r>
             <a:r>
               <a:rPr lang="en-GB" b="1" dirty="0"/>
-              <a:t>University</a:t>
-            </a:r>
-            <a:r>
-              <a:rPr lang="en-GB" dirty="0"/>
-              <a:t>. Many contributions to Computer Vision and Statistical Learning.</a:t>
+              <a:t>Dublin</a:t>
+            </a:r>
+            <a:r>
+              <a:rPr lang="en-GB" dirty="0"/>
+              <a:t>, contributions to </a:t>
+            </a:r>
+            <a:r>
+              <a:rPr lang="en-GB" b="1" dirty="0"/>
+              <a:t>LSTMs</a:t>
+            </a:r>
+            <a:r>
+              <a:rPr lang="en-GB" dirty="0"/>
+              <a:t> and </a:t>
+            </a:r>
+            <a:r>
+              <a:rPr lang="en-GB" b="1" dirty="0"/>
+              <a:t>NLP</a:t>
+            </a:r>
+            <a:r>
+              <a:rPr lang="en-GB" dirty="0"/>
+              <a:t>.</a:t>
             </a:r>
             <a:br>
               <a:rPr lang="en-GB" dirty="0"/>
@@ -10050,18 +9867,64 @@
               <a:rPr lang="en-GB" dirty="0">
                 <a:hlinkClick r:id="rId2"/>
               </a:rPr>
-              <a:t>https://scholar.google.com/citations?user=g-_ZXGsAAAAJ&amp;hl=fr</a:t>
-            </a:r>
-            <a:endParaRPr lang="en-GB" dirty="0"/>
+              <a:t>https://scholar.google.com/citations?user=E-vg2zQAAAAJ&amp;hl=fr</a:t>
+            </a:r>
+            <a:endParaRPr lang="en-GB" b="1" dirty="0"/>
           </a:p>
           <a:p>
             <a:r>
               <a:rPr lang="en-GB" b="1" dirty="0"/>
-              <a:t>Jitendra</a:t>
+              <a:t>Andrej</a:t>
             </a:r>
             <a:r>
               <a:rPr lang="en-GB" dirty="0"/>
               <a:t> </a:t>
+            </a:r>
+            <a:r>
+              <a:rPr lang="en-GB" b="1" dirty="0" err="1">
+                <a:solidFill>
+                  <a:schemeClr val="accent2">
+                    <a:lumMod val="50000"/>
+                  </a:schemeClr>
+                </a:solidFill>
+              </a:rPr>
+              <a:t>Karpathy</a:t>
+            </a:r>
+            <a:r>
+              <a:rPr lang="en-GB" dirty="0"/>
+              <a:t>: </a:t>
+            </a:r>
+            <a:r>
+              <a:rPr lang="en-GB" b="1" dirty="0"/>
+              <a:t>Former</a:t>
+            </a:r>
+            <a:r>
+              <a:rPr lang="en-GB" dirty="0"/>
+              <a:t> </a:t>
+            </a:r>
+            <a:r>
+              <a:rPr lang="en-GB" b="1" dirty="0"/>
+              <a:t>Director</a:t>
+            </a:r>
+            <a:r>
+              <a:rPr lang="en-GB" dirty="0"/>
+              <a:t> </a:t>
+            </a:r>
+            <a:r>
+              <a:rPr lang="en-GB" b="1" dirty="0"/>
+              <a:t>of</a:t>
+            </a:r>
+            <a:r>
+              <a:rPr lang="en-GB" dirty="0"/>
+              <a:t> </a:t>
+            </a:r>
+            <a:r>
+              <a:rPr lang="en-GB" b="1" dirty="0"/>
+              <a:t>AI</a:t>
+            </a:r>
+            <a:r>
+              <a:rPr lang="en-GB" dirty="0"/>
+              <a:t> at </a:t>
             </a:r>
             <a:r>
               <a:rPr lang="en-GB" b="1" dirty="0">
@@ -10071,48 +9934,108 @@
                   </a:schemeClr>
                 </a:solidFill>
               </a:rPr>
-              <a:t>Malik</a:t>
-            </a:r>
-            <a:r>
-              <a:rPr lang="en-GB" dirty="0"/>
-              <a:t>: </a:t>
+              <a:t>Tesla</a:t>
+            </a:r>
+            <a:r>
+              <a:rPr lang="en-GB" dirty="0"/>
+              <a:t>. Many contributions to Computer Vision (</a:t>
+            </a:r>
+            <a:r>
+              <a:rPr lang="en-GB" b="1" dirty="0" err="1"/>
+              <a:t>Imagenet</a:t>
+            </a:r>
+            <a:r>
+              <a:rPr lang="en-GB" dirty="0"/>
+              <a:t>) and NLP (</a:t>
             </a:r>
             <a:r>
               <a:rPr lang="en-GB" b="1" dirty="0"/>
-              <a:t>Professor</a:t>
-            </a:r>
-            <a:r>
-              <a:rPr lang="en-GB" dirty="0"/>
-              <a:t> at </a:t>
-            </a:r>
-            <a:r>
-              <a:rPr lang="en-GB" b="1" dirty="0"/>
-              <a:t>UC</a:t>
-            </a:r>
-            <a:r>
-              <a:rPr lang="en-GB" dirty="0"/>
-              <a:t> </a:t>
-            </a:r>
-            <a:r>
-              <a:rPr lang="en-GB" b="1" dirty="0"/>
-              <a:t>Berkeley</a:t>
-            </a:r>
-            <a:r>
-              <a:rPr lang="en-GB" dirty="0"/>
-              <a:t>. Many contributions to Computer Vision and Statistical Learning. </a:t>
-            </a:r>
+              <a:t>RNNs</a:t>
+            </a:r>
+            <a:r>
+              <a:rPr lang="en-GB" dirty="0"/>
+              <a:t>).</a:t>
+            </a:r>
+            <a:br>
+              <a:rPr lang="en-GB" dirty="0"/>
+            </a:br>
+            <a:r>
+              <a:rPr lang="en-GB" dirty="0"/>
+              <a:t>(Probably better to follow him than Elon Musk.)</a:t>
+            </a:r>
+            <a:br>
+              <a:rPr lang="en-GB" dirty="0"/>
+            </a:br>
             <a:r>
               <a:rPr lang="en-GB" dirty="0">
                 <a:hlinkClick r:id="rId3"/>
               </a:rPr>
-              <a:t>https://scholar.google.com/citations?user=oY9R5YQAAAAJ&amp;hl=fr</a:t>
+              <a:t>https://scholar.google.com/citations?user=l8WuQJgAAAAJ&amp;hl=fr</a:t>
             </a:r>
             <a:endParaRPr lang="en-GB" dirty="0"/>
           </a:p>
           <a:p>
             <a:r>
               <a:rPr lang="en-GB" b="1" dirty="0"/>
-              <a:t>Sebastian</a:t>
+              <a:t>Li</a:t>
+            </a:r>
+            <a:r>
+              <a:rPr lang="en-GB" dirty="0"/>
+              <a:t> </a:t>
+            </a:r>
+            <a:r>
+              <a:rPr lang="en-GB" b="1" dirty="0">
+                <a:solidFill>
+                  <a:schemeClr val="accent2">
+                    <a:lumMod val="50000"/>
+                  </a:schemeClr>
+                </a:solidFill>
+              </a:rPr>
+              <a:t>Fei-Fei</a:t>
+            </a:r>
+            <a:r>
+              <a:rPr lang="en-GB" dirty="0"/>
+              <a:t>: </a:t>
+            </a:r>
+            <a:r>
+              <a:rPr lang="en-GB" b="1" dirty="0"/>
+              <a:t>Professor</a:t>
+            </a:r>
+            <a:r>
+              <a:rPr lang="en-GB" dirty="0"/>
+              <a:t> at </a:t>
+            </a:r>
+            <a:r>
+              <a:rPr lang="en-GB" b="1" dirty="0"/>
+              <a:t>Stanford</a:t>
+            </a:r>
+            <a:r>
+              <a:rPr lang="en-GB" dirty="0"/>
+              <a:t>. Many contributions to Computer Vision (</a:t>
+            </a:r>
+            <a:r>
+              <a:rPr lang="en-GB" b="1" dirty="0" err="1"/>
+              <a:t>Imagenet</a:t>
+            </a:r>
+            <a:r>
+              <a:rPr lang="en-GB" dirty="0"/>
+              <a:t>).</a:t>
+            </a:r>
+            <a:br>
+              <a:rPr lang="en-GB" dirty="0"/>
+            </a:br>
+            <a:r>
+              <a:rPr lang="en-GB" dirty="0">
+                <a:hlinkClick r:id="rId4"/>
+              </a:rPr>
+              <a:t>https://scholar.google.com/citations?user=rDfyQnIAAAAJ&amp;hl=fr</a:t>
+            </a:r>
+            <a:endParaRPr lang="en-GB" dirty="0"/>
+          </a:p>
+          <a:p>
+            <a:r>
+              <a:rPr lang="en-GB" b="1" dirty="0"/>
+              <a:t>Pieter</a:t>
             </a:r>
             <a:r>
               <a:rPr lang="en-GB" dirty="0"/>
@@ -10126,7 +10049,7 @@
                   </a:schemeClr>
                 </a:solidFill>
               </a:rPr>
-              <a:t>Thrun</a:t>
+              <a:t>Abbeel</a:t>
             </a:r>
             <a:r>
               <a:rPr lang="en-GB" dirty="0"/>
@@ -10134,101 +10057,48 @@
             </a:r>
             <a:r>
               <a:rPr lang="en-GB" b="1" dirty="0"/>
-              <a:t>Stanford</a:t>
-            </a:r>
-            <a:r>
-              <a:rPr lang="en-GB" dirty="0"/>
-              <a:t>, cool stuff on </a:t>
+              <a:t>Professor</a:t>
+            </a:r>
+            <a:r>
+              <a:rPr lang="en-GB" dirty="0"/>
+              <a:t> at </a:t>
             </a:r>
             <a:r>
               <a:rPr lang="en-GB" b="1" dirty="0"/>
-              <a:t>robotics</a:t>
-            </a:r>
-            <a:r>
-              <a:rPr lang="en-GB" dirty="0"/>
-              <a:t>.</a:t>
+              <a:t>UC</a:t>
+            </a:r>
+            <a:r>
+              <a:rPr lang="en-GB" dirty="0"/>
+              <a:t> </a:t>
+            </a:r>
+            <a:r>
+              <a:rPr lang="en-GB" b="1" dirty="0"/>
+              <a:t>Berkeley</a:t>
+            </a:r>
+            <a:r>
+              <a:rPr lang="en-GB" dirty="0"/>
+              <a:t>, and a leading researcher in reinforcement learning and robotics.</a:t>
             </a:r>
             <a:br>
               <a:rPr lang="en-GB" dirty="0"/>
             </a:br>
             <a:r>
               <a:rPr lang="en-GB" dirty="0">
-                <a:hlinkClick r:id="rId4"/>
-              </a:rPr>
-              <a:t>https://scholar.google.com/citations?user=7K34d7cAAAAJ&amp;hl=fr</a:t>
-            </a:r>
-            <a:endParaRPr lang="en-GB" dirty="0"/>
-          </a:p>
-          <a:p>
-            <a:r>
-              <a:rPr lang="en-US" b="1" dirty="0"/>
-              <a:t>Daphne</a:t>
-            </a:r>
-            <a:r>
-              <a:rPr lang="en-US" dirty="0"/>
-              <a:t> </a:t>
-            </a:r>
-            <a:r>
-              <a:rPr lang="en-US" b="1" dirty="0">
-                <a:solidFill>
-                  <a:schemeClr val="accent2">
-                    <a:lumMod val="50000"/>
-                  </a:schemeClr>
-                </a:solidFill>
-              </a:rPr>
-              <a:t>Koller</a:t>
-            </a:r>
-            <a:r>
-              <a:rPr lang="en-US" dirty="0"/>
-              <a:t>: </a:t>
-            </a:r>
-            <a:r>
-              <a:rPr lang="en-US" b="1" dirty="0"/>
-              <a:t>CEO</a:t>
-            </a:r>
-            <a:r>
-              <a:rPr lang="en-US" dirty="0"/>
-              <a:t> at </a:t>
-            </a:r>
-            <a:r>
-              <a:rPr lang="en-US" b="1" dirty="0" err="1"/>
-              <a:t>InSitro</a:t>
-            </a:r>
-            <a:r>
-              <a:rPr lang="en-US" dirty="0"/>
-              <a:t>, some cool </a:t>
-            </a:r>
-            <a:r>
-              <a:rPr lang="en-US" b="1" dirty="0"/>
-              <a:t>courses on Coursera</a:t>
-            </a:r>
-            <a:r>
-              <a:rPr lang="en-US" dirty="0"/>
-              <a:t>, she might be the co-founder of Coursera (?).</a:t>
-            </a:r>
-            <a:br>
-              <a:rPr lang="en-US" dirty="0"/>
-            </a:br>
-            <a:r>
-              <a:rPr lang="en-US" dirty="0">
                 <a:hlinkClick r:id="rId5"/>
               </a:rPr>
-              <a:t>https://scholar.google.com/citations?user=5Iqe53IAAAAJ&amp;hl=en</a:t>
-            </a:r>
-            <a:endParaRPr lang="en-US" dirty="0"/>
-          </a:p>
-          <a:p>
-            <a:endParaRPr lang="en-US" dirty="0"/>
-          </a:p>
-          <a:p>
-            <a:endParaRPr lang="en-GB" dirty="0"/>
+              <a:t>https://scholar.google.com/citations?user=vtwH6GkAAAAJ&amp;hl=en</a:t>
+            </a:r>
+            <a:r>
+              <a:rPr lang="en-GB" dirty="0"/>
+              <a:t> </a:t>
+            </a:r>
           </a:p>
         </p:txBody>
       </p:sp>
     </p:spTree>
     <p:extLst>
       <p:ext uri="{BB962C8B-B14F-4D97-AF65-F5344CB8AC3E}">
-        <p14:creationId xmlns:p14="http://schemas.microsoft.com/office/powerpoint/2010/main" val="898875826"/>
+        <p14:creationId xmlns:p14="http://schemas.microsoft.com/office/powerpoint/2010/main" val="3324188887"/>
       </p:ext>
     </p:extLst>
   </p:cSld>
@@ -10316,13 +10186,192 @@
         </p:spPr>
         <p:txBody>
           <a:bodyPr>
-            <a:noAutofit/>
+            <a:normAutofit/>
           </a:bodyPr>
           <a:lstStyle/>
           <a:p>
             <a:r>
+              <a:rPr lang="en-GB" b="1" dirty="0"/>
+              <a:t>Anil</a:t>
+            </a:r>
+            <a:r>
+              <a:rPr lang="en-GB" dirty="0"/>
+              <a:t> </a:t>
+            </a:r>
+            <a:r>
+              <a:rPr lang="en-GB" b="1" dirty="0"/>
+              <a:t>K. </a:t>
+            </a:r>
+            <a:r>
+              <a:rPr lang="en-GB" b="1" dirty="0">
+                <a:solidFill>
+                  <a:schemeClr val="accent2">
+                    <a:lumMod val="50000"/>
+                  </a:schemeClr>
+                </a:solidFill>
+              </a:rPr>
+              <a:t>Jain</a:t>
+            </a:r>
+            <a:r>
+              <a:rPr lang="en-GB" dirty="0"/>
+              <a:t>: </a:t>
+            </a:r>
+            <a:r>
+              <a:rPr lang="en-GB" b="1" dirty="0"/>
+              <a:t>Professor</a:t>
+            </a:r>
+            <a:r>
+              <a:rPr lang="en-GB" dirty="0"/>
+              <a:t> at </a:t>
+            </a:r>
+            <a:r>
+              <a:rPr lang="en-GB" b="1" dirty="0"/>
+              <a:t>Michigan</a:t>
+            </a:r>
+            <a:r>
+              <a:rPr lang="en-GB" dirty="0"/>
+              <a:t> </a:t>
+            </a:r>
+            <a:r>
+              <a:rPr lang="en-GB" b="1" dirty="0"/>
+              <a:t>State</a:t>
+            </a:r>
+            <a:r>
+              <a:rPr lang="en-GB" dirty="0"/>
+              <a:t> </a:t>
+            </a:r>
+            <a:r>
+              <a:rPr lang="en-GB" b="1" dirty="0"/>
+              <a:t>University</a:t>
+            </a:r>
+            <a:r>
+              <a:rPr lang="en-GB" dirty="0"/>
+              <a:t>. Many contributions to Computer Vision and Statistical Learning.</a:t>
+            </a:r>
+            <a:br>
+              <a:rPr lang="en-GB" dirty="0"/>
+            </a:br>
+            <a:r>
+              <a:rPr lang="en-GB" dirty="0">
+                <a:hlinkClick r:id="rId2"/>
+              </a:rPr>
+              <a:t>https://scholar.google.com/citations?user=g-_ZXGsAAAAJ&amp;hl=fr</a:t>
+            </a:r>
+            <a:endParaRPr lang="en-GB" dirty="0"/>
+          </a:p>
+          <a:p>
+            <a:r>
+              <a:rPr lang="en-GB" b="1" dirty="0"/>
+              <a:t>Jitendra</a:t>
+            </a:r>
+            <a:r>
+              <a:rPr lang="en-GB" dirty="0"/>
+              <a:t> </a:t>
+            </a:r>
+            <a:r>
+              <a:rPr lang="en-GB" b="1" dirty="0">
+                <a:solidFill>
+                  <a:schemeClr val="accent2">
+                    <a:lumMod val="50000"/>
+                  </a:schemeClr>
+                </a:solidFill>
+              </a:rPr>
+              <a:t>Malik</a:t>
+            </a:r>
+            <a:r>
+              <a:rPr lang="en-GB" dirty="0"/>
+              <a:t>: </a:t>
+            </a:r>
+            <a:r>
+              <a:rPr lang="en-GB" b="1" dirty="0"/>
+              <a:t>Professor</a:t>
+            </a:r>
+            <a:r>
+              <a:rPr lang="en-GB" dirty="0"/>
+              <a:t> at </a:t>
+            </a:r>
+            <a:r>
+              <a:rPr lang="en-GB" b="1" dirty="0"/>
+              <a:t>UC</a:t>
+            </a:r>
+            <a:r>
+              <a:rPr lang="en-GB" dirty="0"/>
+              <a:t> </a:t>
+            </a:r>
+            <a:r>
+              <a:rPr lang="en-GB" b="1" dirty="0"/>
+              <a:t>Berkeley</a:t>
+            </a:r>
+            <a:r>
+              <a:rPr lang="en-GB" dirty="0"/>
+              <a:t>. Many contributions to Computer Vision and Statistical Learning. </a:t>
+            </a:r>
+            <a:r>
+              <a:rPr lang="en-GB" dirty="0">
+                <a:hlinkClick r:id="rId3"/>
+              </a:rPr>
+              <a:t>https://scholar.google.com/citations?user=oY9R5YQAAAAJ&amp;hl=fr</a:t>
+            </a:r>
+            <a:endParaRPr lang="en-GB" dirty="0"/>
+          </a:p>
+          <a:p>
+            <a:r>
+              <a:rPr lang="en-GB" b="1" dirty="0"/>
+              <a:t>Sebastian</a:t>
+            </a:r>
+            <a:r>
+              <a:rPr lang="en-GB" dirty="0"/>
+              <a:t> </a:t>
+            </a:r>
+            <a:r>
+              <a:rPr lang="en-GB" b="1" dirty="0" err="1">
+                <a:solidFill>
+                  <a:schemeClr val="accent2">
+                    <a:lumMod val="50000"/>
+                  </a:schemeClr>
+                </a:solidFill>
+              </a:rPr>
+              <a:t>Thrun</a:t>
+            </a:r>
+            <a:r>
+              <a:rPr lang="en-GB" dirty="0"/>
+              <a:t>: </a:t>
+            </a:r>
+            <a:r>
+              <a:rPr lang="en-GB" b="1" dirty="0"/>
+              <a:t>Stanford</a:t>
+            </a:r>
+            <a:r>
+              <a:rPr lang="en-GB" dirty="0"/>
+              <a:t>, cool stuff on </a:t>
+            </a:r>
+            <a:r>
+              <a:rPr lang="en-GB" b="1" dirty="0"/>
+              <a:t>robotics</a:t>
+            </a:r>
+            <a:r>
+              <a:rPr lang="en-GB" dirty="0"/>
+              <a:t>.</a:t>
+            </a:r>
+            <a:br>
+              <a:rPr lang="en-GB" dirty="0"/>
+            </a:br>
+            <a:r>
+              <a:rPr lang="en-GB" dirty="0">
+                <a:hlinkClick r:id="rId4"/>
+              </a:rPr>
+              <a:t>https://scholar.google.com/citations?user=7K34d7cAAAAJ&amp;hl=fr</a:t>
+            </a:r>
+            <a:endParaRPr lang="en-GB" dirty="0"/>
+          </a:p>
+          <a:p>
+            <a:r>
               <a:rPr lang="en-US" b="1" dirty="0"/>
-              <a:t>Andrew </a:t>
+              <a:t>Daphne</a:t>
+            </a:r>
+            <a:r>
+              <a:rPr lang="en-US" dirty="0"/>
+              <a:t> </a:t>
             </a:r>
             <a:r>
               <a:rPr lang="en-US" b="1" dirty="0">
@@ -10332,7 +10381,7 @@
                   </a:schemeClr>
                 </a:solidFill>
               </a:rPr>
-              <a:t>Ng</a:t>
+              <a:t>Koller</a:t>
             </a:r>
             <a:r>
               <a:rPr lang="en-US" dirty="0"/>
@@ -10340,265 +10389,37 @@
             </a:r>
             <a:r>
               <a:rPr lang="en-US" b="1" dirty="0"/>
-              <a:t>Professor</a:t>
+              <a:t>CEO</a:t>
             </a:r>
             <a:r>
               <a:rPr lang="en-US" dirty="0"/>
               <a:t> at </a:t>
             </a:r>
             <a:r>
+              <a:rPr lang="en-US" b="1" dirty="0" err="1"/>
+              <a:t>InSitro</a:t>
+            </a:r>
+            <a:r>
+              <a:rPr lang="en-US" dirty="0"/>
+              <a:t>, some cool </a:t>
+            </a:r>
+            <a:r>
               <a:rPr lang="en-US" b="1" dirty="0"/>
-              <a:t>Stanford</a:t>
+              <a:t>courses on Coursera</a:t>
             </a:r>
             <a:r>
               <a:rPr lang="en-US" dirty="0"/>
-              <a:t>, co-creator of </a:t>
-            </a:r>
-            <a:r>
-              <a:rPr lang="en-US" b="1" dirty="0">
-                <a:solidFill>
-                  <a:schemeClr val="accent2">
-                    <a:lumMod val="50000"/>
-                  </a:schemeClr>
-                </a:solidFill>
-              </a:rPr>
-              <a:t>Coursera</a:t>
-            </a:r>
-            <a:r>
-              <a:rPr lang="en-US" dirty="0"/>
-              <a:t>. Has one of the best online courses on Deep Learning.</a:t>
+              <a:t>, she might be the co-founder of Coursera (?).</a:t>
             </a:r>
             <a:br>
               <a:rPr lang="en-US" dirty="0"/>
             </a:br>
             <a:r>
               <a:rPr lang="en-US" dirty="0">
-                <a:hlinkClick r:id="rId2"/>
-              </a:rPr>
-              <a:t>https://scholar.google.com/citations?user=mG4imMEAAAAJ&amp;hl=en</a:t>
-            </a:r>
-            <a:endParaRPr lang="en-US" dirty="0"/>
-          </a:p>
-          <a:p>
-            <a:r>
-              <a:rPr lang="en-US" b="1" dirty="0"/>
-              <a:t>Jeremy</a:t>
-            </a:r>
-            <a:r>
-              <a:rPr lang="en-US" dirty="0"/>
-              <a:t> </a:t>
-            </a:r>
-            <a:r>
-              <a:rPr lang="en-US" b="1" dirty="0">
-                <a:solidFill>
-                  <a:schemeClr val="accent2">
-                    <a:lumMod val="50000"/>
-                  </a:schemeClr>
-                </a:solidFill>
-              </a:rPr>
-              <a:t>Howard</a:t>
-            </a:r>
-            <a:r>
-              <a:rPr lang="en-US" dirty="0"/>
-              <a:t>: </a:t>
-            </a:r>
-            <a:r>
-              <a:rPr lang="en-US" b="1" dirty="0"/>
-              <a:t>Research</a:t>
-            </a:r>
-            <a:r>
-              <a:rPr lang="en-US" dirty="0"/>
-              <a:t> </a:t>
-            </a:r>
-            <a:r>
-              <a:rPr lang="en-US" b="1" dirty="0"/>
-              <a:t>Scientist</a:t>
-            </a:r>
-            <a:r>
-              <a:rPr lang="en-US" dirty="0"/>
-              <a:t> at </a:t>
-            </a:r>
-            <a:r>
-              <a:rPr lang="en-US" b="1" dirty="0"/>
-              <a:t>University</a:t>
-            </a:r>
-            <a:r>
-              <a:rPr lang="en-US" dirty="0"/>
-              <a:t> </a:t>
-            </a:r>
-            <a:r>
-              <a:rPr lang="en-US" b="1" dirty="0"/>
-              <a:t>of</a:t>
-            </a:r>
-            <a:r>
-              <a:rPr lang="en-US" dirty="0"/>
-              <a:t> </a:t>
-            </a:r>
-            <a:r>
-              <a:rPr lang="en-US" b="1" dirty="0"/>
-              <a:t>San</a:t>
-            </a:r>
-            <a:r>
-              <a:rPr lang="en-US" dirty="0"/>
-              <a:t> </a:t>
-            </a:r>
-            <a:r>
-              <a:rPr lang="en-US" b="1" dirty="0"/>
-              <a:t>Francisco</a:t>
-            </a:r>
-            <a:r>
-              <a:rPr lang="en-US" dirty="0"/>
-              <a:t>, a good scout for notable research papers on Twitter and </a:t>
-            </a:r>
-            <a:r>
-              <a:rPr lang="en-US" b="1" dirty="0"/>
-              <a:t>TED</a:t>
-            </a:r>
-            <a:r>
-              <a:rPr lang="en-US" dirty="0"/>
-              <a:t> </a:t>
-            </a:r>
-            <a:r>
-              <a:rPr lang="en-US" b="1" dirty="0"/>
-              <a:t>talks</a:t>
-            </a:r>
-            <a:r>
-              <a:rPr lang="en-US" dirty="0"/>
-              <a:t>.</a:t>
-            </a:r>
-            <a:br>
-              <a:rPr lang="en-US" dirty="0"/>
-            </a:br>
-            <a:r>
-              <a:rPr lang="en-US" dirty="0">
-                <a:hlinkClick r:id="rId3"/>
-              </a:rPr>
-              <a:t>https://scholar.google.com/citations?user=ZWdEJ54AAAAJ&amp;hl=en</a:t>
-            </a:r>
-            <a:endParaRPr lang="en-US" dirty="0"/>
-          </a:p>
-          <a:p>
-            <a:r>
-              <a:rPr lang="en-GB" b="1" dirty="0" err="1"/>
-              <a:t>Yaser</a:t>
-            </a:r>
-            <a:r>
-              <a:rPr lang="en-GB" b="1" dirty="0"/>
-              <a:t> S. </a:t>
-            </a:r>
-            <a:r>
-              <a:rPr lang="en-GB" b="1" dirty="0">
-                <a:solidFill>
-                  <a:schemeClr val="accent2">
-                    <a:lumMod val="50000"/>
-                  </a:schemeClr>
-                </a:solidFill>
-              </a:rPr>
-              <a:t>Abu-Mostafa</a:t>
-            </a:r>
-            <a:r>
-              <a:rPr lang="en-GB" dirty="0"/>
-              <a:t>: </a:t>
-            </a:r>
-            <a:r>
-              <a:rPr lang="en-GB" b="1" dirty="0"/>
-              <a:t>Professor</a:t>
-            </a:r>
-            <a:r>
-              <a:rPr lang="en-GB" dirty="0"/>
-              <a:t> at </a:t>
-            </a:r>
-            <a:r>
-              <a:rPr lang="en-GB" b="1" dirty="0" err="1"/>
-              <a:t>CalTech</a:t>
-            </a:r>
-            <a:r>
-              <a:rPr lang="en-GB" dirty="0"/>
-              <a:t>, one of the best professors for Deep Learning out there.</a:t>
-            </a:r>
-            <a:br>
-              <a:rPr lang="en-GB" b="1" dirty="0"/>
-            </a:br>
-            <a:r>
-              <a:rPr lang="en-US" dirty="0">
-                <a:hlinkClick r:id="rId4"/>
-              </a:rPr>
-              <a:t>https://dblp.org/pid/69/3008.html</a:t>
-            </a:r>
-            <a:endParaRPr lang="en-US" dirty="0"/>
-          </a:p>
-          <a:p>
-            <a:r>
-              <a:rPr lang="en-GB" b="1" dirty="0"/>
-              <a:t>Rachel L. </a:t>
-            </a:r>
-            <a:r>
-              <a:rPr lang="en-GB" b="1" dirty="0">
-                <a:solidFill>
-                  <a:schemeClr val="accent2">
-                    <a:lumMod val="50000"/>
-                  </a:schemeClr>
-                </a:solidFill>
-              </a:rPr>
-              <a:t>Thomas</a:t>
-            </a:r>
-            <a:r>
-              <a:rPr lang="en-GB" dirty="0"/>
-              <a:t>: </a:t>
-            </a:r>
-            <a:r>
-              <a:rPr lang="en-GB" b="1" dirty="0"/>
-              <a:t>University</a:t>
-            </a:r>
-            <a:r>
-              <a:rPr lang="en-GB" dirty="0"/>
-              <a:t> of </a:t>
-            </a:r>
-            <a:r>
-              <a:rPr lang="en-GB" b="1" dirty="0"/>
-              <a:t>San</a:t>
-            </a:r>
-            <a:r>
-              <a:rPr lang="en-GB" dirty="0"/>
-              <a:t> </a:t>
-            </a:r>
-            <a:r>
-              <a:rPr lang="en-GB" b="1" dirty="0"/>
-              <a:t>Francisco</a:t>
-            </a:r>
-            <a:r>
-              <a:rPr lang="en-GB" dirty="0"/>
-              <a:t>, </a:t>
-            </a:r>
-            <a:r>
-              <a:rPr lang="en-GB" b="1" dirty="0" err="1">
-                <a:solidFill>
-                  <a:schemeClr val="accent2">
-                    <a:lumMod val="50000"/>
-                  </a:schemeClr>
-                </a:solidFill>
-              </a:rPr>
-              <a:t>FastAI</a:t>
-            </a:r>
-            <a:r>
-              <a:rPr lang="en-GB" dirty="0"/>
-              <a:t>, some great TED conferences on AI and Deep Learning. </a:t>
-            </a:r>
-            <a:r>
-              <a:rPr lang="en-US" dirty="0">
                 <a:hlinkClick r:id="rId5"/>
               </a:rPr>
-              <a:t>https://scholar.google.com/citations?user=BDsAYUsAAAAJ&amp;hl=en</a:t>
-            </a:r>
-            <a:endParaRPr lang="en-US" dirty="0"/>
-          </a:p>
-          <a:p>
-            <a:endParaRPr lang="en-US" dirty="0"/>
-          </a:p>
-          <a:p>
-            <a:endParaRPr lang="en-US" dirty="0"/>
-          </a:p>
-          <a:p>
+              <a:t>https://scholar.google.com/citations?user=5Iqe53IAAAAJ&amp;hl=en</a:t>
+            </a:r>
             <a:endParaRPr lang="en-US" dirty="0"/>
           </a:p>
           <a:p>
@@ -10612,7 +10433,7 @@
     </p:spTree>
     <p:extLst>
       <p:ext uri="{BB962C8B-B14F-4D97-AF65-F5344CB8AC3E}">
-        <p14:creationId xmlns:p14="http://schemas.microsoft.com/office/powerpoint/2010/main" val="58723962"/>
+        <p14:creationId xmlns:p14="http://schemas.microsoft.com/office/powerpoint/2010/main" val="898875826"/>
       </p:ext>
     </p:extLst>
   </p:cSld>
@@ -10641,10 +10462,10 @@
       </p:grpSpPr>
       <p:sp>
         <p:nvSpPr>
-          <p:cNvPr id="2" name="Title 1">
-            <a:extLst>
-              <a:ext uri="{FF2B5EF4-FFF2-40B4-BE49-F238E27FC236}">
-                <a16:creationId xmlns:a16="http://schemas.microsoft.com/office/drawing/2014/main" id="{B92DC6AA-6003-92C9-D6A7-FDE5AD7DEF4F}"/>
+          <p:cNvPr id="4" name="Title 3">
+            <a:extLst>
+              <a:ext uri="{FF2B5EF4-FFF2-40B4-BE49-F238E27FC236}">
+                <a16:creationId xmlns:a16="http://schemas.microsoft.com/office/drawing/2014/main" id="{1715EAD9-59BF-46C0-9089-6E366691CAE9}"/>
               </a:ext>
             </a:extLst>
           </p:cNvPr>
@@ -10661,19 +10482,27 @@
           <a:lstStyle/>
           <a:p>
             <a:r>
-              <a:rPr lang="en-GB" dirty="0"/>
-              <a:t>Also worth subscribing to a few free newsletters about AI/DL</a:t>
-            </a:r>
-            <a:endParaRPr lang="en-SG" dirty="0"/>
-          </a:p>
-        </p:txBody>
-      </p:sp>
-      <p:sp>
-        <p:nvSpPr>
-          <p:cNvPr id="3" name="Content Placeholder 2">
-            <a:extLst>
-              <a:ext uri="{FF2B5EF4-FFF2-40B4-BE49-F238E27FC236}">
-                <a16:creationId xmlns:a16="http://schemas.microsoft.com/office/drawing/2014/main" id="{4276CAE7-B917-7B38-533B-E801722307F4}"/>
+              <a:rPr lang="en-US" dirty="0"/>
+              <a:t>Add these researchers, companies and research </a:t>
+            </a:r>
+            <a:r>
+              <a:rPr lang="en-US" dirty="0" err="1"/>
+              <a:t>groupes</a:t>
+            </a:r>
+            <a:r>
+              <a:rPr lang="en-US" dirty="0"/>
+              <a:t> to your watchlist</a:t>
+            </a:r>
+            <a:endParaRPr lang="en-GB" dirty="0"/>
+          </a:p>
+        </p:txBody>
+      </p:sp>
+      <p:sp>
+        <p:nvSpPr>
+          <p:cNvPr id="5" name="Content Placeholder 4">
+            <a:extLst>
+              <a:ext uri="{FF2B5EF4-FFF2-40B4-BE49-F238E27FC236}">
+                <a16:creationId xmlns:a16="http://schemas.microsoft.com/office/drawing/2014/main" id="{279FF99D-84CB-436E-9373-43EB3F28720A}"/>
               </a:ext>
             </a:extLst>
           </p:cNvPr>
@@ -10692,124 +10521,303 @@
         </p:spPr>
         <p:txBody>
           <a:bodyPr>
-            <a:normAutofit/>
+            <a:noAutofit/>
           </a:bodyPr>
           <a:lstStyle/>
           <a:p>
             <a:r>
-              <a:rPr lang="en-GB" dirty="0"/>
-              <a:t>The Batch newsletter by DeepLearning.ai (</a:t>
-            </a:r>
-            <a:r>
-              <a:rPr lang="en-GB" dirty="0">
+              <a:rPr lang="en-US" b="1" dirty="0"/>
+              <a:t>Andrew </a:t>
+            </a:r>
+            <a:r>
+              <a:rPr lang="en-US" b="1" dirty="0">
+                <a:solidFill>
+                  <a:schemeClr val="accent2">
+                    <a:lumMod val="50000"/>
+                  </a:schemeClr>
+                </a:solidFill>
+              </a:rPr>
+              <a:t>Ng</a:t>
+            </a:r>
+            <a:r>
+              <a:rPr lang="en-US" dirty="0"/>
+              <a:t>: </a:t>
+            </a:r>
+            <a:r>
+              <a:rPr lang="en-US" b="1" dirty="0"/>
+              <a:t>Professor</a:t>
+            </a:r>
+            <a:r>
+              <a:rPr lang="en-US" dirty="0"/>
+              <a:t> at </a:t>
+            </a:r>
+            <a:r>
+              <a:rPr lang="en-US" b="1" dirty="0"/>
+              <a:t>Stanford</a:t>
+            </a:r>
+            <a:r>
+              <a:rPr lang="en-US" dirty="0"/>
+              <a:t>, co-creator of </a:t>
+            </a:r>
+            <a:r>
+              <a:rPr lang="en-US" b="1" dirty="0">
+                <a:solidFill>
+                  <a:schemeClr val="accent2">
+                    <a:lumMod val="50000"/>
+                  </a:schemeClr>
+                </a:solidFill>
+              </a:rPr>
+              <a:t>Coursera</a:t>
+            </a:r>
+            <a:r>
+              <a:rPr lang="en-US" dirty="0"/>
+              <a:t>. Has one of the best online courses on Deep Learning.</a:t>
+            </a:r>
+            <a:br>
+              <a:rPr lang="en-US" dirty="0"/>
+            </a:br>
+            <a:r>
+              <a:rPr lang="en-US" dirty="0">
                 <a:hlinkClick r:id="rId2"/>
               </a:rPr>
-              <a:t>https://www.deeplearning.ai/the-batch/</a:t>
-            </a:r>
-            <a:r>
-              <a:rPr lang="en-GB" dirty="0"/>
-              <a:t>)</a:t>
-            </a:r>
-          </a:p>
-          <a:p>
-            <a:r>
-              <a:rPr lang="en-GB" dirty="0"/>
-              <a:t>The Algorithm by MIT Tech Review (</a:t>
-            </a:r>
-            <a:r>
-              <a:rPr lang="en-GB" dirty="0">
+              <a:t>https://scholar.google.com/citations?user=mG4imMEAAAAJ&amp;hl=en</a:t>
+            </a:r>
+            <a:endParaRPr lang="en-US" dirty="0"/>
+          </a:p>
+          <a:p>
+            <a:r>
+              <a:rPr lang="en-US" b="1" dirty="0"/>
+              <a:t>Jeremy</a:t>
+            </a:r>
+            <a:r>
+              <a:rPr lang="en-US" dirty="0"/>
+              <a:t> </a:t>
+            </a:r>
+            <a:r>
+              <a:rPr lang="en-US" b="1" dirty="0">
+                <a:solidFill>
+                  <a:schemeClr val="accent2">
+                    <a:lumMod val="50000"/>
+                  </a:schemeClr>
+                </a:solidFill>
+              </a:rPr>
+              <a:t>Howard</a:t>
+            </a:r>
+            <a:r>
+              <a:rPr lang="en-US" dirty="0"/>
+              <a:t>: </a:t>
+            </a:r>
+            <a:r>
+              <a:rPr lang="en-US" b="1" dirty="0"/>
+              <a:t>Research</a:t>
+            </a:r>
+            <a:r>
+              <a:rPr lang="en-US" dirty="0"/>
+              <a:t> </a:t>
+            </a:r>
+            <a:r>
+              <a:rPr lang="en-US" b="1" dirty="0"/>
+              <a:t>Scientist</a:t>
+            </a:r>
+            <a:r>
+              <a:rPr lang="en-US" dirty="0"/>
+              <a:t> at </a:t>
+            </a:r>
+            <a:r>
+              <a:rPr lang="en-US" b="1" dirty="0"/>
+              <a:t>University</a:t>
+            </a:r>
+            <a:r>
+              <a:rPr lang="en-US" dirty="0"/>
+              <a:t> </a:t>
+            </a:r>
+            <a:r>
+              <a:rPr lang="en-US" b="1" dirty="0"/>
+              <a:t>of</a:t>
+            </a:r>
+            <a:r>
+              <a:rPr lang="en-US" dirty="0"/>
+              <a:t> </a:t>
+            </a:r>
+            <a:r>
+              <a:rPr lang="en-US" b="1" dirty="0"/>
+              <a:t>San</a:t>
+            </a:r>
+            <a:r>
+              <a:rPr lang="en-US" dirty="0"/>
+              <a:t> </a:t>
+            </a:r>
+            <a:r>
+              <a:rPr lang="en-US" b="1" dirty="0"/>
+              <a:t>Francisco</a:t>
+            </a:r>
+            <a:r>
+              <a:rPr lang="en-US" dirty="0"/>
+              <a:t>, a good scout for notable research papers on Twitter and </a:t>
+            </a:r>
+            <a:r>
+              <a:rPr lang="en-US" b="1" dirty="0"/>
+              <a:t>TED</a:t>
+            </a:r>
+            <a:r>
+              <a:rPr lang="en-US" dirty="0"/>
+              <a:t> </a:t>
+            </a:r>
+            <a:r>
+              <a:rPr lang="en-US" b="1" dirty="0"/>
+              <a:t>talks</a:t>
+            </a:r>
+            <a:r>
+              <a:rPr lang="en-US" dirty="0"/>
+              <a:t>.</a:t>
+            </a:r>
+            <a:br>
+              <a:rPr lang="en-US" dirty="0"/>
+            </a:br>
+            <a:r>
+              <a:rPr lang="en-US" dirty="0">
                 <a:hlinkClick r:id="rId3"/>
               </a:rPr>
-              <a:t>https://www.technologyreview.com/newsletter-preferences/</a:t>
-            </a:r>
-            <a:r>
-              <a:rPr lang="en-GB" dirty="0"/>
-              <a:t>)</a:t>
-            </a:r>
-          </a:p>
-          <a:p>
-            <a:r>
-              <a:rPr lang="en-GB" dirty="0"/>
-              <a:t>The TLDR; newsletter (</a:t>
-            </a:r>
-            <a:r>
-              <a:rPr lang="en-GB" dirty="0">
+              <a:t>https://scholar.google.com/citations?user=ZWdEJ54AAAAJ&amp;hl=en</a:t>
+            </a:r>
+            <a:endParaRPr lang="en-US" dirty="0"/>
+          </a:p>
+          <a:p>
+            <a:r>
+              <a:rPr lang="en-GB" b="1" dirty="0" err="1"/>
+              <a:t>Yaser</a:t>
+            </a:r>
+            <a:r>
+              <a:rPr lang="en-GB" b="1" dirty="0"/>
+              <a:t> S. </a:t>
+            </a:r>
+            <a:r>
+              <a:rPr lang="en-GB" b="1" dirty="0">
+                <a:solidFill>
+                  <a:schemeClr val="accent2">
+                    <a:lumMod val="50000"/>
+                  </a:schemeClr>
+                </a:solidFill>
+              </a:rPr>
+              <a:t>Abu-Mostafa</a:t>
+            </a:r>
+            <a:r>
+              <a:rPr lang="en-GB" dirty="0"/>
+              <a:t>: </a:t>
+            </a:r>
+            <a:r>
+              <a:rPr lang="en-GB" b="1" dirty="0"/>
+              <a:t>Professor</a:t>
+            </a:r>
+            <a:r>
+              <a:rPr lang="en-GB" dirty="0"/>
+              <a:t> at </a:t>
+            </a:r>
+            <a:r>
+              <a:rPr lang="en-GB" b="1" dirty="0" err="1"/>
+              <a:t>CalTech</a:t>
+            </a:r>
+            <a:r>
+              <a:rPr lang="en-GB" dirty="0"/>
+              <a:t>, one of the best professors for Deep Learning out there.</a:t>
+            </a:r>
+            <a:br>
+              <a:rPr lang="en-GB" b="1" dirty="0"/>
+            </a:br>
+            <a:r>
+              <a:rPr lang="en-US" dirty="0">
                 <a:hlinkClick r:id="rId4"/>
               </a:rPr>
-              <a:t>https://tldr.tech/</a:t>
-            </a:r>
-            <a:r>
-              <a:rPr lang="en-GB" dirty="0"/>
-              <a:t>)</a:t>
-            </a:r>
-          </a:p>
-          <a:p>
-            <a:r>
-              <a:rPr lang="en-GB" dirty="0"/>
-              <a:t>The NLP Newsletter (</a:t>
-            </a:r>
-            <a:r>
-              <a:rPr lang="en-GB" dirty="0">
+              <a:t>https://dblp.org/pid/69/3008.html</a:t>
+            </a:r>
+            <a:endParaRPr lang="en-US" dirty="0"/>
+          </a:p>
+          <a:p>
+            <a:r>
+              <a:rPr lang="en-GB" b="1" dirty="0"/>
+              <a:t>Rachel L. </a:t>
+            </a:r>
+            <a:r>
+              <a:rPr lang="en-GB" b="1" dirty="0">
+                <a:solidFill>
+                  <a:schemeClr val="accent2">
+                    <a:lumMod val="50000"/>
+                  </a:schemeClr>
+                </a:solidFill>
+              </a:rPr>
+              <a:t>Thomas</a:t>
+            </a:r>
+            <a:r>
+              <a:rPr lang="en-GB" dirty="0"/>
+              <a:t>: </a:t>
+            </a:r>
+            <a:r>
+              <a:rPr lang="en-GB" b="1" dirty="0"/>
+              <a:t>University</a:t>
+            </a:r>
+            <a:r>
+              <a:rPr lang="en-GB" dirty="0"/>
+              <a:t> of </a:t>
+            </a:r>
+            <a:r>
+              <a:rPr lang="en-GB" b="1" dirty="0"/>
+              <a:t>San</a:t>
+            </a:r>
+            <a:r>
+              <a:rPr lang="en-GB" dirty="0"/>
+              <a:t> </a:t>
+            </a:r>
+            <a:r>
+              <a:rPr lang="en-GB" b="1" dirty="0"/>
+              <a:t>Francisco</a:t>
+            </a:r>
+            <a:r>
+              <a:rPr lang="en-GB" dirty="0"/>
+              <a:t>, </a:t>
+            </a:r>
+            <a:r>
+              <a:rPr lang="en-GB" b="1" dirty="0" err="1">
+                <a:solidFill>
+                  <a:schemeClr val="accent2">
+                    <a:lumMod val="50000"/>
+                  </a:schemeClr>
+                </a:solidFill>
+              </a:rPr>
+              <a:t>FastAI</a:t>
+            </a:r>
+            <a:r>
+              <a:rPr lang="en-GB" dirty="0"/>
+              <a:t>, some great TED conferences on AI and Deep Learning. </a:t>
+            </a:r>
+            <a:r>
+              <a:rPr lang="en-US" dirty="0">
                 <a:hlinkClick r:id="rId5"/>
               </a:rPr>
-              <a:t>https://www.ruder.io/nlp-news/</a:t>
-            </a:r>
-            <a:r>
-              <a:rPr lang="en-GB" dirty="0"/>
-              <a:t>)</a:t>
-            </a:r>
-          </a:p>
-          <a:p>
-            <a:r>
-              <a:rPr lang="en-GB" dirty="0"/>
-              <a:t>The </a:t>
-            </a:r>
-            <a:r>
-              <a:rPr lang="en-GB" dirty="0" err="1"/>
-              <a:t>AlphaSignal</a:t>
-            </a:r>
-            <a:r>
-              <a:rPr lang="en-GB" dirty="0"/>
-              <a:t> newsletter (</a:t>
-            </a:r>
-            <a:r>
-              <a:rPr lang="en-GB" dirty="0">
-                <a:hlinkClick r:id="rId6"/>
-              </a:rPr>
-              <a:t>https://alphasignal.ai/</a:t>
-            </a:r>
-            <a:r>
-              <a:rPr lang="en-GB" dirty="0"/>
-              <a:t>)</a:t>
-            </a:r>
-          </a:p>
-          <a:p>
-            <a:pPr marL="0" indent="0">
-              <a:buNone/>
-            </a:pPr>
-            <a:r>
-              <a:rPr lang="en-GB" dirty="0"/>
-              <a:t>Some Medium subscription never hurts (sometimes nice, easy and accessible discussions about AI).</a:t>
-            </a:r>
-          </a:p>
-          <a:p>
-            <a:pPr marL="0" indent="0">
-              <a:buNone/>
-            </a:pPr>
-            <a:r>
-              <a:rPr lang="en-GB" dirty="0"/>
-              <a:t>But most seriously though, go for Twitter and follow people.</a:t>
-            </a:r>
-          </a:p>
-          <a:p>
-            <a:endParaRPr lang="en-SG" dirty="0"/>
+              <a:t>https://scholar.google.com/citations?user=BDsAYUsAAAAJ&amp;hl=en</a:t>
+            </a:r>
+            <a:endParaRPr lang="en-US" dirty="0"/>
+          </a:p>
+          <a:p>
+            <a:endParaRPr lang="en-US" dirty="0"/>
+          </a:p>
+          <a:p>
+            <a:endParaRPr lang="en-US" dirty="0"/>
+          </a:p>
+          <a:p>
+            <a:endParaRPr lang="en-US" dirty="0"/>
+          </a:p>
+          <a:p>
+            <a:endParaRPr lang="en-US" dirty="0"/>
+          </a:p>
+          <a:p>
+            <a:endParaRPr lang="en-GB" dirty="0"/>
           </a:p>
         </p:txBody>
       </p:sp>
     </p:spTree>
     <p:extLst>
       <p:ext uri="{BB962C8B-B14F-4D97-AF65-F5344CB8AC3E}">
-        <p14:creationId xmlns:p14="http://schemas.microsoft.com/office/powerpoint/2010/main" val="630819480"/>
+        <p14:creationId xmlns:p14="http://schemas.microsoft.com/office/powerpoint/2010/main" val="58723962"/>
       </p:ext>
     </p:extLst>
   </p:cSld>
@@ -10841,7 +10849,7 @@
           <p:cNvPr id="2" name="Title 1">
             <a:extLst>
               <a:ext uri="{FF2B5EF4-FFF2-40B4-BE49-F238E27FC236}">
-                <a16:creationId xmlns:a16="http://schemas.microsoft.com/office/drawing/2014/main" id="{019176B1-DBFC-41ED-61D8-A32E47CBE543}"/>
+                <a16:creationId xmlns:a16="http://schemas.microsoft.com/office/drawing/2014/main" id="{B92DC6AA-6003-92C9-D6A7-FDE5AD7DEF4F}"/>
               </a:ext>
             </a:extLst>
           </p:cNvPr>
@@ -10859,8 +10867,9 @@
           <a:p>
             <a:r>
               <a:rPr lang="en-GB" dirty="0"/>
-              <a:t>Cracking the Deep Learning interview</a:t>
-            </a:r>
+              <a:t>Also worth subscribing to a few free newsletters about AI/DL</a:t>
+            </a:r>
+            <a:endParaRPr lang="en-SG" dirty="0"/>
           </a:p>
         </p:txBody>
       </p:sp>
@@ -10869,7 +10878,7 @@
           <p:cNvPr id="3" name="Content Placeholder 2">
             <a:extLst>
               <a:ext uri="{FF2B5EF4-FFF2-40B4-BE49-F238E27FC236}">
-                <a16:creationId xmlns:a16="http://schemas.microsoft.com/office/drawing/2014/main" id="{42E94496-CCBC-467D-504B-C943DBDCBD88}"/>
+                <a16:creationId xmlns:a16="http://schemas.microsoft.com/office/drawing/2014/main" id="{4276CAE7-B917-7B38-533B-E801722307F4}"/>
               </a:ext>
             </a:extLst>
           </p:cNvPr>
@@ -10892,72 +10901,120 @@
           </a:bodyPr>
           <a:lstStyle/>
           <a:p>
-            <a:pPr marL="0" indent="0">
-              <a:buNone/>
-            </a:pPr>
-            <a:r>
-              <a:rPr lang="en-GB" dirty="0"/>
-              <a:t>Most </a:t>
-            </a:r>
-            <a:r>
-              <a:rPr lang="en-GB" dirty="0" err="1"/>
-              <a:t>BigTech</a:t>
-            </a:r>
-            <a:r>
-              <a:rPr lang="en-GB" dirty="0"/>
-              <a:t> companies out there will test you on your CS/DL skills upon applying to positions/jobs in their companies.</a:t>
-            </a:r>
-          </a:p>
-          <a:p>
-            <a:r>
-              <a:rPr lang="en-GB" dirty="0"/>
-              <a:t>Train!</a:t>
-            </a:r>
-          </a:p>
-          <a:p>
-            <a:r>
-              <a:rPr lang="en-GB" dirty="0"/>
-              <a:t>Many flashcards with typical AI/ML/DL questions and tasks given in technical interviews at </a:t>
-            </a:r>
-            <a:r>
-              <a:rPr lang="en-GB" dirty="0" err="1"/>
-              <a:t>BigTech</a:t>
-            </a:r>
-            <a:r>
-              <a:rPr lang="en-GB" dirty="0"/>
-              <a:t> companies.</a:t>
-            </a:r>
-          </a:p>
-          <a:p>
+            <a:r>
+              <a:rPr lang="en-GB" dirty="0"/>
+              <a:t>The Batch newsletter by DeepLearning.ai (</a:t>
+            </a:r>
             <a:r>
               <a:rPr lang="en-GB" dirty="0">
                 <a:hlinkClick r:id="rId2"/>
               </a:rPr>
-              <a:t>https://www.algoexpert.io/machine-learning/product</a:t>
-            </a:r>
-            <a:endParaRPr lang="en-GB" dirty="0"/>
-          </a:p>
-          <a:p>
+              <a:t>https://www.deeplearning.ai/the-batch/</a:t>
+            </a:r>
+            <a:r>
+              <a:rPr lang="en-GB" dirty="0"/>
+              <a:t>)</a:t>
+            </a:r>
+          </a:p>
+          <a:p>
+            <a:r>
+              <a:rPr lang="en-GB" dirty="0"/>
+              <a:t>The Algorithm by MIT Tech Review (</a:t>
+            </a:r>
             <a:r>
               <a:rPr lang="en-GB" dirty="0">
                 <a:hlinkClick r:id="rId3"/>
               </a:rPr>
-              <a:t>https://www.mlexpert.io/</a:t>
-            </a:r>
-            <a:endParaRPr lang="en-GB" dirty="0"/>
-          </a:p>
-          <a:p>
-            <a:endParaRPr lang="en-GB" dirty="0"/>
-          </a:p>
-          <a:p>
-            <a:endParaRPr lang="en-GB" dirty="0"/>
+              <a:t>https://www.technologyreview.com/newsletter-preferences/</a:t>
+            </a:r>
+            <a:r>
+              <a:rPr lang="en-GB" dirty="0"/>
+              <a:t>)</a:t>
+            </a:r>
+          </a:p>
+          <a:p>
+            <a:r>
+              <a:rPr lang="en-GB" dirty="0"/>
+              <a:t>The TLDR; newsletter (</a:t>
+            </a:r>
+            <a:r>
+              <a:rPr lang="en-GB" dirty="0">
+                <a:hlinkClick r:id="rId4"/>
+              </a:rPr>
+              <a:t>https://tldr.tech/</a:t>
+            </a:r>
+            <a:r>
+              <a:rPr lang="en-GB" dirty="0"/>
+              <a:t>)</a:t>
+            </a:r>
+          </a:p>
+          <a:p>
+            <a:r>
+              <a:rPr lang="en-GB" dirty="0"/>
+              <a:t>The NLP Newsletter (</a:t>
+            </a:r>
+            <a:r>
+              <a:rPr lang="en-GB" dirty="0">
+                <a:hlinkClick r:id="rId5"/>
+              </a:rPr>
+              <a:t>https://www.ruder.io/nlp-news/</a:t>
+            </a:r>
+            <a:r>
+              <a:rPr lang="en-GB" dirty="0"/>
+              <a:t>)</a:t>
+            </a:r>
+          </a:p>
+          <a:p>
+            <a:r>
+              <a:rPr lang="en-GB" dirty="0"/>
+              <a:t>The </a:t>
+            </a:r>
+            <a:r>
+              <a:rPr lang="en-GB" dirty="0" err="1"/>
+              <a:t>AlphaSignal</a:t>
+            </a:r>
+            <a:r>
+              <a:rPr lang="en-GB" dirty="0"/>
+              <a:t> newsletter (</a:t>
+            </a:r>
+            <a:r>
+              <a:rPr lang="en-GB" dirty="0">
+                <a:hlinkClick r:id="rId6"/>
+              </a:rPr>
+              <a:t>https://alphasignal.ai/</a:t>
+            </a:r>
+            <a:r>
+              <a:rPr lang="en-GB" dirty="0"/>
+              <a:t>)</a:t>
+            </a:r>
+          </a:p>
+          <a:p>
+            <a:pPr marL="0" indent="0">
+              <a:buNone/>
+            </a:pPr>
+            <a:r>
+              <a:rPr lang="en-GB" dirty="0"/>
+              <a:t>Some Medium subscription never hurts (sometimes nice, easy and accessible discussions about AI).</a:t>
+            </a:r>
+          </a:p>
+          <a:p>
+            <a:pPr marL="0" indent="0">
+              <a:buNone/>
+            </a:pPr>
+            <a:r>
+              <a:rPr lang="en-GB" dirty="0"/>
+              <a:t>But most seriously though, go for Twitter and follow people.</a:t>
+            </a:r>
+          </a:p>
+          <a:p>
+            <a:endParaRPr lang="en-SG" dirty="0"/>
           </a:p>
         </p:txBody>
       </p:sp>
     </p:spTree>
     <p:extLst>
       <p:ext uri="{BB962C8B-B14F-4D97-AF65-F5344CB8AC3E}">
-        <p14:creationId xmlns:p14="http://schemas.microsoft.com/office/powerpoint/2010/main" val="2770851000"/>
+        <p14:creationId xmlns:p14="http://schemas.microsoft.com/office/powerpoint/2010/main" val="630819480"/>
       </p:ext>
     </p:extLst>
   </p:cSld>
@@ -11045,19 +11102,35 @@
             </a:pPr>
             <a:r>
               <a:rPr lang="en-GB" dirty="0"/>
-              <a:t>More importantly, polish your GitHub with some nice ML/AI/DL projects that you can show and discuss in interviews!</a:t>
-            </a:r>
-          </a:p>
-          <a:p>
-            <a:r>
-              <a:rPr lang="en-GB" dirty="0"/>
-              <a:t>Document your codes and notebooks over the summer break!</a:t>
-            </a:r>
-          </a:p>
-          <a:p>
-            <a:r>
-              <a:rPr lang="en-GB" dirty="0"/>
-              <a:t>Many problems out there, easily investigated.</a:t>
+              <a:t>Most </a:t>
+            </a:r>
+            <a:r>
+              <a:rPr lang="en-GB" dirty="0" err="1"/>
+              <a:t>BigTech</a:t>
+            </a:r>
+            <a:r>
+              <a:rPr lang="en-GB" dirty="0"/>
+              <a:t> companies out there will test you on your CS/DL skills upon applying to positions/jobs in their companies.</a:t>
+            </a:r>
+          </a:p>
+          <a:p>
+            <a:r>
+              <a:rPr lang="en-GB" dirty="0"/>
+              <a:t>Train!</a:t>
+            </a:r>
+          </a:p>
+          <a:p>
+            <a:r>
+              <a:rPr lang="en-GB" dirty="0"/>
+              <a:t>Many flashcards with typical AI/ML/DL questions and tasks given in technical interviews at </a:t>
+            </a:r>
+            <a:r>
+              <a:rPr lang="en-GB" dirty="0" err="1"/>
+              <a:t>BigTech</a:t>
+            </a:r>
+            <a:r>
+              <a:rPr lang="en-GB" dirty="0"/>
+              <a:t> companies.</a:t>
             </a:r>
           </a:p>
           <a:p>
@@ -11065,33 +11138,18 @@
               <a:rPr lang="en-GB" dirty="0">
                 <a:hlinkClick r:id="rId2"/>
               </a:rPr>
-              <a:t>https://twitter.com/0xbnomial/status/1523256409529667584?t=YWXdKryCUrrJSCKWLiT4Tg&amp;s=03</a:t>
+              <a:t>https://www.algoexpert.io/machine-learning/product</a:t>
             </a:r>
             <a:endParaRPr lang="en-GB" dirty="0"/>
           </a:p>
           <a:p>
-            <a:pPr marL="0" indent="0">
-              <a:buNone/>
-            </a:pPr>
+            <a:r>
+              <a:rPr lang="en-GB" dirty="0">
+                <a:hlinkClick r:id="rId3"/>
+              </a:rPr>
+              <a:t>https://www.mlexpert.io/</a:t>
+            </a:r>
             <a:endParaRPr lang="en-GB" dirty="0"/>
-          </a:p>
-          <a:p>
-            <a:r>
-              <a:rPr lang="en-GB"/>
-              <a:t>Other </a:t>
-            </a:r>
-            <a:r>
-              <a:rPr lang="en-GB" dirty="0"/>
-              <a:t>p</a:t>
-            </a:r>
-            <a:r>
-              <a:rPr lang="en-GB"/>
-              <a:t>ossible </a:t>
-            </a:r>
-            <a:r>
-              <a:rPr lang="en-GB" dirty="0"/>
-              <a:t>idea: Find one problem for each concept we discussed each week this term and make a repo/project about it!</a:t>
-            </a:r>
           </a:p>
           <a:p>
             <a:endParaRPr lang="en-GB" dirty="0"/>
@@ -11104,7 +11162,7 @@
     </p:spTree>
     <p:extLst>
       <p:ext uri="{BB962C8B-B14F-4D97-AF65-F5344CB8AC3E}">
-        <p14:creationId xmlns:p14="http://schemas.microsoft.com/office/powerpoint/2010/main" val="885132000"/>
+        <p14:creationId xmlns:p14="http://schemas.microsoft.com/office/powerpoint/2010/main" val="2770851000"/>
       </p:ext>
     </p:extLst>
   </p:cSld>
@@ -11136,6 +11194,153 @@
           <p:cNvPr id="2" name="Title 1">
             <a:extLst>
               <a:ext uri="{FF2B5EF4-FFF2-40B4-BE49-F238E27FC236}">
+                <a16:creationId xmlns:a16="http://schemas.microsoft.com/office/drawing/2014/main" id="{019176B1-DBFC-41ED-61D8-A32E47CBE543}"/>
+              </a:ext>
+            </a:extLst>
+          </p:cNvPr>
+          <p:cNvSpPr>
+            <a:spLocks noGrp="1"/>
+          </p:cNvSpPr>
+          <p:nvPr>
+            <p:ph type="title"/>
+          </p:nvPr>
+        </p:nvSpPr>
+        <p:spPr/>
+        <p:txBody>
+          <a:bodyPr/>
+          <a:lstStyle/>
+          <a:p>
+            <a:r>
+              <a:rPr lang="en-GB" dirty="0"/>
+              <a:t>Cracking the Deep Learning interview</a:t>
+            </a:r>
+          </a:p>
+        </p:txBody>
+      </p:sp>
+      <p:sp>
+        <p:nvSpPr>
+          <p:cNvPr id="3" name="Content Placeholder 2">
+            <a:extLst>
+              <a:ext uri="{FF2B5EF4-FFF2-40B4-BE49-F238E27FC236}">
+                <a16:creationId xmlns:a16="http://schemas.microsoft.com/office/drawing/2014/main" id="{42E94496-CCBC-467D-504B-C943DBDCBD88}"/>
+              </a:ext>
+            </a:extLst>
+          </p:cNvPr>
+          <p:cNvSpPr>
+            <a:spLocks noGrp="1"/>
+          </p:cNvSpPr>
+          <p:nvPr>
+            <p:ph idx="1"/>
+          </p:nvPr>
+        </p:nvSpPr>
+        <p:spPr>
+          <a:xfrm>
+            <a:off x="838200" y="1825624"/>
+            <a:ext cx="10515600" cy="5032375"/>
+          </a:xfrm>
+        </p:spPr>
+        <p:txBody>
+          <a:bodyPr>
+            <a:normAutofit/>
+          </a:bodyPr>
+          <a:lstStyle/>
+          <a:p>
+            <a:pPr marL="0" indent="0">
+              <a:buNone/>
+            </a:pPr>
+            <a:r>
+              <a:rPr lang="en-GB" dirty="0"/>
+              <a:t>More importantly, polish your GitHub with some nice ML/AI/DL projects that you can show and discuss in interviews!</a:t>
+            </a:r>
+          </a:p>
+          <a:p>
+            <a:r>
+              <a:rPr lang="en-GB" dirty="0"/>
+              <a:t>Document your codes and notebooks over the summer break!</a:t>
+            </a:r>
+          </a:p>
+          <a:p>
+            <a:r>
+              <a:rPr lang="en-GB" dirty="0"/>
+              <a:t>Many problems out there, easily investigated.</a:t>
+            </a:r>
+          </a:p>
+          <a:p>
+            <a:r>
+              <a:rPr lang="en-GB" dirty="0">
+                <a:hlinkClick r:id="rId2"/>
+              </a:rPr>
+              <a:t>https://twitter.com/0xbnomial/status/1523256409529667584?t=YWXdKryCUrrJSCKWLiT4Tg&amp;s=03</a:t>
+            </a:r>
+            <a:endParaRPr lang="en-GB" dirty="0"/>
+          </a:p>
+          <a:p>
+            <a:pPr marL="0" indent="0">
+              <a:buNone/>
+            </a:pPr>
+            <a:endParaRPr lang="en-GB" dirty="0"/>
+          </a:p>
+          <a:p>
+            <a:r>
+              <a:rPr lang="en-GB"/>
+              <a:t>Other </a:t>
+            </a:r>
+            <a:r>
+              <a:rPr lang="en-GB" dirty="0"/>
+              <a:t>p</a:t>
+            </a:r>
+            <a:r>
+              <a:rPr lang="en-GB"/>
+              <a:t>ossible </a:t>
+            </a:r>
+            <a:r>
+              <a:rPr lang="en-GB" dirty="0"/>
+              <a:t>idea: Find one problem for each concept we discussed each week this term and make a repo/project about it!</a:t>
+            </a:r>
+          </a:p>
+          <a:p>
+            <a:endParaRPr lang="en-GB" dirty="0"/>
+          </a:p>
+          <a:p>
+            <a:endParaRPr lang="en-GB" dirty="0"/>
+          </a:p>
+        </p:txBody>
+      </p:sp>
+    </p:spTree>
+    <p:extLst>
+      <p:ext uri="{BB962C8B-B14F-4D97-AF65-F5344CB8AC3E}">
+        <p14:creationId xmlns:p14="http://schemas.microsoft.com/office/powerpoint/2010/main" val="885132000"/>
+      </p:ext>
+    </p:extLst>
+  </p:cSld>
+  <p:clrMapOvr>
+    <a:masterClrMapping/>
+  </p:clrMapOvr>
+</p:sld>
+</file>
+
+<file path=ppt/slides/slide37.xml><?xml version="1.0" encoding="utf-8"?>
+<p:sld xmlns:a="http://schemas.openxmlformats.org/drawingml/2006/main" xmlns:r="http://schemas.openxmlformats.org/officeDocument/2006/relationships" xmlns:p="http://schemas.openxmlformats.org/presentationml/2006/main">
+  <p:cSld>
+    <p:spTree>
+      <p:nvGrpSpPr>
+        <p:cNvPr id="1" name=""/>
+        <p:cNvGrpSpPr/>
+        <p:nvPr/>
+      </p:nvGrpSpPr>
+      <p:grpSpPr>
+        <a:xfrm>
+          <a:off x="0" y="0"/>
+          <a:ext cx="0" cy="0"/>
+          <a:chOff x="0" y="0"/>
+          <a:chExt cx="0" cy="0"/>
+        </a:xfrm>
+      </p:grpSpPr>
+      <p:sp>
+        <p:nvSpPr>
+          <p:cNvPr id="2" name="Title 1">
+            <a:extLst>
+              <a:ext uri="{FF2B5EF4-FFF2-40B4-BE49-F238E27FC236}">
                 <a16:creationId xmlns:a16="http://schemas.microsoft.com/office/drawing/2014/main" id="{B1A60A88-5173-1242-4140-FC3E7017323F}"/>
               </a:ext>
             </a:extLst>
@@ -11266,7 +11471,7 @@
 </p:sld>
 </file>
 
-<file path=ppt/slides/slide37.xml><?xml version="1.0" encoding="utf-8"?>
+<file path=ppt/slides/slide38.xml><?xml version="1.0" encoding="utf-8"?>
 <p:sld xmlns:a="http://schemas.openxmlformats.org/drawingml/2006/main" xmlns:r="http://schemas.openxmlformats.org/officeDocument/2006/relationships" xmlns:p="http://schemas.openxmlformats.org/presentationml/2006/main">
   <p:cSld>
     <p:spTree>
@@ -11413,7 +11618,7 @@
 </p:sld>
 </file>
 
-<file path=ppt/slides/slide38.xml><?xml version="1.0" encoding="utf-8"?>
+<file path=ppt/slides/slide39.xml><?xml version="1.0" encoding="utf-8"?>
 <p:sld xmlns:a="http://schemas.openxmlformats.org/drawingml/2006/main" xmlns:r="http://schemas.openxmlformats.org/officeDocument/2006/relationships" xmlns:p="http://schemas.openxmlformats.org/presentationml/2006/main">
   <p:cSld>
     <p:spTree>
@@ -11660,7 +11865,163 @@
 </p:sld>
 </file>
 
-<file path=ppt/slides/slide39.xml><?xml version="1.0" encoding="utf-8"?>
+<file path=ppt/slides/slide4.xml><?xml version="1.0" encoding="utf-8"?>
+<p:sld xmlns:a="http://schemas.openxmlformats.org/drawingml/2006/main" xmlns:r="http://schemas.openxmlformats.org/officeDocument/2006/relationships" xmlns:p="http://schemas.openxmlformats.org/presentationml/2006/main">
+  <p:cSld>
+    <p:spTree>
+      <p:nvGrpSpPr>
+        <p:cNvPr id="1" name=""/>
+        <p:cNvGrpSpPr/>
+        <p:nvPr/>
+      </p:nvGrpSpPr>
+      <p:grpSpPr>
+        <a:xfrm>
+          <a:off x="0" y="0"/>
+          <a:ext cx="0" cy="0"/>
+          <a:chOff x="0" y="0"/>
+          <a:chExt cx="0" cy="0"/>
+        </a:xfrm>
+      </p:grpSpPr>
+      <p:sp>
+        <p:nvSpPr>
+          <p:cNvPr id="4" name="Title 3">
+            <a:extLst>
+              <a:ext uri="{FF2B5EF4-FFF2-40B4-BE49-F238E27FC236}">
+                <a16:creationId xmlns:a16="http://schemas.microsoft.com/office/drawing/2014/main" id="{15864A73-91DC-47E6-BFC6-77EC81F88251}"/>
+              </a:ext>
+            </a:extLst>
+          </p:cNvPr>
+          <p:cNvSpPr>
+            <a:spLocks noGrp="1"/>
+          </p:cNvSpPr>
+          <p:nvPr>
+            <p:ph type="title"/>
+          </p:nvPr>
+        </p:nvSpPr>
+        <p:spPr/>
+        <p:txBody>
+          <a:bodyPr/>
+          <a:lstStyle/>
+          <a:p>
+            <a:r>
+              <a:rPr lang="en-US" dirty="0"/>
+              <a:t>Develop a deeper understanding of…</a:t>
+            </a:r>
+            <a:endParaRPr lang="en-GB" dirty="0"/>
+          </a:p>
+        </p:txBody>
+      </p:sp>
+      <p:sp>
+        <p:nvSpPr>
+          <p:cNvPr id="5" name="Content Placeholder 4">
+            <a:extLst>
+              <a:ext uri="{FF2B5EF4-FFF2-40B4-BE49-F238E27FC236}">
+                <a16:creationId xmlns:a16="http://schemas.microsoft.com/office/drawing/2014/main" id="{8D68AA04-CE99-4E3D-A743-B4FE0611BB3C}"/>
+              </a:ext>
+            </a:extLst>
+          </p:cNvPr>
+          <p:cNvSpPr>
+            <a:spLocks noGrp="1"/>
+          </p:cNvSpPr>
+          <p:nvPr>
+            <p:ph idx="1"/>
+          </p:nvPr>
+        </p:nvSpPr>
+        <p:spPr>
+          <a:xfrm>
+            <a:off x="838200" y="1825624"/>
+            <a:ext cx="10515600" cy="5032375"/>
+          </a:xfrm>
+        </p:spPr>
+        <p:txBody>
+          <a:bodyPr/>
+          <a:lstStyle/>
+          <a:p>
+            <a:pPr marL="0" indent="0">
+              <a:buNone/>
+            </a:pPr>
+            <a:r>
+              <a:rPr lang="en-US" b="1" dirty="0"/>
+              <a:t>Improving training procedures (W2++)</a:t>
+            </a:r>
+          </a:p>
+          <a:p>
+            <a:pPr marL="0" indent="0">
+              <a:buNone/>
+            </a:pPr>
+            <a:r>
+              <a:rPr lang="en-GB" dirty="0"/>
+              <a:t>At the moment, mostly using gradient descent algorithms to train our models…</a:t>
+            </a:r>
+          </a:p>
+          <a:p>
+            <a:pPr marL="0" indent="0">
+              <a:buNone/>
+            </a:pPr>
+            <a:r>
+              <a:rPr lang="en-GB" dirty="0"/>
+              <a:t>Many different directions have been considered, for instance:</a:t>
+            </a:r>
+          </a:p>
+          <a:p>
+            <a:r>
+              <a:rPr lang="en-GB" dirty="0"/>
+              <a:t>Using Forward-Forward (2022 proposal from Hinton, to replace our conventional backprop?): </a:t>
+            </a:r>
+            <a:r>
+              <a:rPr lang="en-GB" dirty="0">
+                <a:hlinkClick r:id="rId2"/>
+              </a:rPr>
+              <a:t>https://arxiv.org/abs/2212.13345</a:t>
+            </a:r>
+            <a:r>
+              <a:rPr lang="en-GB" dirty="0"/>
+              <a:t> </a:t>
+            </a:r>
+          </a:p>
+          <a:p>
+            <a:r>
+              <a:rPr lang="en-GB" dirty="0"/>
+              <a:t>Training AIs to train other AIs?: “learning to learn” or “meta-learning”</a:t>
+            </a:r>
+            <a:br>
+              <a:rPr lang="en-GB" dirty="0"/>
+            </a:br>
+            <a:r>
+              <a:rPr lang="en-GB" dirty="0"/>
+              <a:t>Curious?: </a:t>
+            </a:r>
+            <a:r>
+              <a:rPr lang="en-GB" dirty="0">
+                <a:hlinkClick r:id="rId3"/>
+              </a:rPr>
+              <a:t>https://machinelearningmastery.com/meta-learning-in-machine-learning/</a:t>
+            </a:r>
+            <a:r>
+              <a:rPr lang="en-GB" dirty="0"/>
+              <a:t> </a:t>
+            </a:r>
+            <a:endParaRPr lang="en-US" dirty="0"/>
+          </a:p>
+          <a:p>
+            <a:endParaRPr lang="en-GB" dirty="0"/>
+          </a:p>
+        </p:txBody>
+      </p:sp>
+    </p:spTree>
+    <p:extLst>
+      <p:ext uri="{BB962C8B-B14F-4D97-AF65-F5344CB8AC3E}">
+        <p14:creationId xmlns:p14="http://schemas.microsoft.com/office/powerpoint/2010/main" val="2489181972"/>
+      </p:ext>
+    </p:extLst>
+  </p:cSld>
+  <p:clrMapOvr>
+    <a:masterClrMapping/>
+  </p:clrMapOvr>
+</p:sld>
+</file>
+
+<file path=ppt/slides/slide40.xml><?xml version="1.0" encoding="utf-8"?>
 <p:sld xmlns:a="http://schemas.openxmlformats.org/drawingml/2006/main" xmlns:r="http://schemas.openxmlformats.org/officeDocument/2006/relationships" xmlns:p="http://schemas.openxmlformats.org/presentationml/2006/main">
   <p:cSld>
     <p:spTree>
@@ -11885,162 +12246,6 @@
     <p:extLst>
       <p:ext uri="{BB962C8B-B14F-4D97-AF65-F5344CB8AC3E}">
         <p14:creationId xmlns:p14="http://schemas.microsoft.com/office/powerpoint/2010/main" val="2410329214"/>
-      </p:ext>
-    </p:extLst>
-  </p:cSld>
-  <p:clrMapOvr>
-    <a:masterClrMapping/>
-  </p:clrMapOvr>
-</p:sld>
-</file>
-
-<file path=ppt/slides/slide4.xml><?xml version="1.0" encoding="utf-8"?>
-<p:sld xmlns:a="http://schemas.openxmlformats.org/drawingml/2006/main" xmlns:r="http://schemas.openxmlformats.org/officeDocument/2006/relationships" xmlns:p="http://schemas.openxmlformats.org/presentationml/2006/main">
-  <p:cSld>
-    <p:spTree>
-      <p:nvGrpSpPr>
-        <p:cNvPr id="1" name=""/>
-        <p:cNvGrpSpPr/>
-        <p:nvPr/>
-      </p:nvGrpSpPr>
-      <p:grpSpPr>
-        <a:xfrm>
-          <a:off x="0" y="0"/>
-          <a:ext cx="0" cy="0"/>
-          <a:chOff x="0" y="0"/>
-          <a:chExt cx="0" cy="0"/>
-        </a:xfrm>
-      </p:grpSpPr>
-      <p:sp>
-        <p:nvSpPr>
-          <p:cNvPr id="4" name="Title 3">
-            <a:extLst>
-              <a:ext uri="{FF2B5EF4-FFF2-40B4-BE49-F238E27FC236}">
-                <a16:creationId xmlns:a16="http://schemas.microsoft.com/office/drawing/2014/main" id="{15864A73-91DC-47E6-BFC6-77EC81F88251}"/>
-              </a:ext>
-            </a:extLst>
-          </p:cNvPr>
-          <p:cNvSpPr>
-            <a:spLocks noGrp="1"/>
-          </p:cNvSpPr>
-          <p:nvPr>
-            <p:ph type="title"/>
-          </p:nvPr>
-        </p:nvSpPr>
-        <p:spPr/>
-        <p:txBody>
-          <a:bodyPr/>
-          <a:lstStyle/>
-          <a:p>
-            <a:r>
-              <a:rPr lang="en-US" dirty="0"/>
-              <a:t>Develop a deeper understanding of…</a:t>
-            </a:r>
-            <a:endParaRPr lang="en-GB" dirty="0"/>
-          </a:p>
-        </p:txBody>
-      </p:sp>
-      <p:sp>
-        <p:nvSpPr>
-          <p:cNvPr id="5" name="Content Placeholder 4">
-            <a:extLst>
-              <a:ext uri="{FF2B5EF4-FFF2-40B4-BE49-F238E27FC236}">
-                <a16:creationId xmlns:a16="http://schemas.microsoft.com/office/drawing/2014/main" id="{8D68AA04-CE99-4E3D-A743-B4FE0611BB3C}"/>
-              </a:ext>
-            </a:extLst>
-          </p:cNvPr>
-          <p:cNvSpPr>
-            <a:spLocks noGrp="1"/>
-          </p:cNvSpPr>
-          <p:nvPr>
-            <p:ph idx="1"/>
-          </p:nvPr>
-        </p:nvSpPr>
-        <p:spPr>
-          <a:xfrm>
-            <a:off x="838200" y="1825624"/>
-            <a:ext cx="10515600" cy="5032375"/>
-          </a:xfrm>
-        </p:spPr>
-        <p:txBody>
-          <a:bodyPr/>
-          <a:lstStyle/>
-          <a:p>
-            <a:pPr marL="0" indent="0">
-              <a:buNone/>
-            </a:pPr>
-            <a:r>
-              <a:rPr lang="en-US" b="1" dirty="0"/>
-              <a:t>Improving training procedures (W2++)</a:t>
-            </a:r>
-          </a:p>
-          <a:p>
-            <a:pPr marL="0" indent="0">
-              <a:buNone/>
-            </a:pPr>
-            <a:r>
-              <a:rPr lang="en-GB" dirty="0"/>
-              <a:t>At the moment, mostly using gradient descent algorithms to train our models…</a:t>
-            </a:r>
-          </a:p>
-          <a:p>
-            <a:pPr marL="0" indent="0">
-              <a:buNone/>
-            </a:pPr>
-            <a:r>
-              <a:rPr lang="en-GB" dirty="0"/>
-              <a:t>Many different directions have been considered, for instance:</a:t>
-            </a:r>
-          </a:p>
-          <a:p>
-            <a:r>
-              <a:rPr lang="en-GB" dirty="0"/>
-              <a:t>Using Forward-Forward (2022 proposal from Hinton, to replace our conventional backprop?): </a:t>
-            </a:r>
-            <a:r>
-              <a:rPr lang="en-GB" dirty="0">
-                <a:hlinkClick r:id="rId2"/>
-              </a:rPr>
-              <a:t>https://arxiv.org/abs/2212.13345</a:t>
-            </a:r>
-            <a:r>
-              <a:rPr lang="en-GB" dirty="0"/>
-              <a:t> </a:t>
-            </a:r>
-          </a:p>
-          <a:p>
-            <a:r>
-              <a:rPr lang="en-GB" dirty="0"/>
-              <a:t>Training AIs to train other AIs?: “learning to learn” or “meta-learning”</a:t>
-            </a:r>
-            <a:br>
-              <a:rPr lang="en-GB" dirty="0"/>
-            </a:br>
-            <a:r>
-              <a:rPr lang="en-GB" dirty="0"/>
-              <a:t>Curious?: </a:t>
-            </a:r>
-            <a:r>
-              <a:rPr lang="en-GB" dirty="0">
-                <a:hlinkClick r:id="rId3"/>
-              </a:rPr>
-              <a:t>https://machinelearningmastery.com/meta-learning-in-machine-learning/</a:t>
-            </a:r>
-            <a:r>
-              <a:rPr lang="en-GB" dirty="0"/>
-              <a:t> </a:t>
-            </a:r>
-            <a:endParaRPr lang="en-US" dirty="0"/>
-          </a:p>
-          <a:p>
-            <a:endParaRPr lang="en-GB" dirty="0"/>
-          </a:p>
-        </p:txBody>
-      </p:sp>
-    </p:spTree>
-    <p:extLst>
-      <p:ext uri="{BB962C8B-B14F-4D97-AF65-F5344CB8AC3E}">
-        <p14:creationId xmlns:p14="http://schemas.microsoft.com/office/powerpoint/2010/main" val="2489181972"/>
       </p:ext>
     </p:extLst>
   </p:cSld>

</xml_diff>